<commit_message>
Updated deck for DC17
</commit_message>
<xml_diff>
--- a/DC17 Towards Elastic Scalability.pptx
+++ b/DC17 Towards Elastic Scalability.pptx
@@ -5,48 +5,51 @@
     <p:sldMasterId id="2147483648" r:id="rId1"/>
   </p:sldMasterIdLst>
   <p:notesMasterIdLst>
-    <p:notesMasterId r:id="rId41"/>
+    <p:notesMasterId r:id="rId44"/>
   </p:notesMasterIdLst>
   <p:sldIdLst>
     <p:sldId id="256" r:id="rId2"/>
     <p:sldId id="258" r:id="rId3"/>
     <p:sldId id="292" r:id="rId4"/>
-    <p:sldId id="259" r:id="rId5"/>
-    <p:sldId id="257" r:id="rId6"/>
-    <p:sldId id="260" r:id="rId7"/>
-    <p:sldId id="270" r:id="rId8"/>
-    <p:sldId id="262" r:id="rId9"/>
-    <p:sldId id="273" r:id="rId10"/>
-    <p:sldId id="276" r:id="rId11"/>
-    <p:sldId id="274" r:id="rId12"/>
-    <p:sldId id="275" r:id="rId13"/>
-    <p:sldId id="283" r:id="rId14"/>
-    <p:sldId id="277" r:id="rId15"/>
-    <p:sldId id="278" r:id="rId16"/>
-    <p:sldId id="263" r:id="rId17"/>
-    <p:sldId id="264" r:id="rId18"/>
-    <p:sldId id="265" r:id="rId19"/>
-    <p:sldId id="272" r:id="rId20"/>
-    <p:sldId id="288" r:id="rId21"/>
-    <p:sldId id="289" r:id="rId22"/>
-    <p:sldId id="271" r:id="rId23"/>
-    <p:sldId id="266" r:id="rId24"/>
-    <p:sldId id="293" r:id="rId25"/>
-    <p:sldId id="267" r:id="rId26"/>
-    <p:sldId id="284" r:id="rId27"/>
-    <p:sldId id="285" r:id="rId28"/>
-    <p:sldId id="286" r:id="rId29"/>
-    <p:sldId id="287" r:id="rId30"/>
-    <p:sldId id="280" r:id="rId31"/>
-    <p:sldId id="279" r:id="rId32"/>
-    <p:sldId id="281" r:id="rId33"/>
-    <p:sldId id="269" r:id="rId34"/>
-    <p:sldId id="282" r:id="rId35"/>
-    <p:sldId id="294" r:id="rId36"/>
-    <p:sldId id="295" r:id="rId37"/>
-    <p:sldId id="291" r:id="rId38"/>
-    <p:sldId id="290" r:id="rId39"/>
-    <p:sldId id="268" r:id="rId40"/>
+    <p:sldId id="297" r:id="rId5"/>
+    <p:sldId id="259" r:id="rId6"/>
+    <p:sldId id="257" r:id="rId7"/>
+    <p:sldId id="260" r:id="rId8"/>
+    <p:sldId id="270" r:id="rId9"/>
+    <p:sldId id="262" r:id="rId10"/>
+    <p:sldId id="273" r:id="rId11"/>
+    <p:sldId id="276" r:id="rId12"/>
+    <p:sldId id="274" r:id="rId13"/>
+    <p:sldId id="275" r:id="rId14"/>
+    <p:sldId id="283" r:id="rId15"/>
+    <p:sldId id="298" r:id="rId16"/>
+    <p:sldId id="277" r:id="rId17"/>
+    <p:sldId id="278" r:id="rId18"/>
+    <p:sldId id="263" r:id="rId19"/>
+    <p:sldId id="264" r:id="rId20"/>
+    <p:sldId id="265" r:id="rId21"/>
+    <p:sldId id="272" r:id="rId22"/>
+    <p:sldId id="288" r:id="rId23"/>
+    <p:sldId id="289" r:id="rId24"/>
+    <p:sldId id="271" r:id="rId25"/>
+    <p:sldId id="266" r:id="rId26"/>
+    <p:sldId id="293" r:id="rId27"/>
+    <p:sldId id="267" r:id="rId28"/>
+    <p:sldId id="284" r:id="rId29"/>
+    <p:sldId id="285" r:id="rId30"/>
+    <p:sldId id="286" r:id="rId31"/>
+    <p:sldId id="287" r:id="rId32"/>
+    <p:sldId id="280" r:id="rId33"/>
+    <p:sldId id="279" r:id="rId34"/>
+    <p:sldId id="281" r:id="rId35"/>
+    <p:sldId id="269" r:id="rId36"/>
+    <p:sldId id="282" r:id="rId37"/>
+    <p:sldId id="296" r:id="rId38"/>
+    <p:sldId id="294" r:id="rId39"/>
+    <p:sldId id="295" r:id="rId40"/>
+    <p:sldId id="291" r:id="rId41"/>
+    <p:sldId id="290" r:id="rId42"/>
+    <p:sldId id="268" r:id="rId43"/>
   </p:sldIdLst>
   <p:sldSz cx="12192000" cy="6858000"/>
   <p:notesSz cx="6858000" cy="9144000"/>
@@ -239,7 +242,7 @@
           <a:p>
             <a:fld id="{058BE8FC-50E9-4513-94B9-EC5EE628F7F8}" type="datetimeFigureOut">
               <a:rPr lang="en-US" smtClean="0"/>
-              <a:t>7/10/2017</a:t>
+              <a:t>7/11/2017</a:t>
             </a:fld>
             <a:endParaRPr lang="en-US"/>
           </a:p>
@@ -574,7 +577,7 @@
           <a:p>
             <a:fld id="{2EA83CDC-A0E6-42C1-A015-39A6C54F2109}" type="slidenum">
               <a:rPr lang="en-US" smtClean="0"/>
-              <a:t>6</a:t>
+              <a:t>7</a:t>
             </a:fld>
             <a:endParaRPr lang="en-US"/>
           </a:p>
@@ -661,7 +664,7 @@
           <a:p>
             <a:fld id="{2EA83CDC-A0E6-42C1-A015-39A6C54F2109}" type="slidenum">
               <a:rPr lang="en-US" smtClean="0"/>
-              <a:t>7</a:t>
+              <a:t>8</a:t>
             </a:fld>
             <a:endParaRPr lang="en-US"/>
           </a:p>
@@ -748,7 +751,7 @@
           <a:p>
             <a:fld id="{2EA83CDC-A0E6-42C1-A015-39A6C54F2109}" type="slidenum">
               <a:rPr lang="en-US" smtClean="0"/>
-              <a:t>9</a:t>
+              <a:t>10</a:t>
             </a:fld>
             <a:endParaRPr lang="en-US"/>
           </a:p>
@@ -840,7 +843,7 @@
           <a:p>
             <a:fld id="{2EA83CDC-A0E6-42C1-A015-39A6C54F2109}" type="slidenum">
               <a:rPr lang="en-US" smtClean="0"/>
-              <a:t>10</a:t>
+              <a:t>11</a:t>
             </a:fld>
             <a:endParaRPr lang="en-US"/>
           </a:p>
@@ -932,7 +935,7 @@
           <a:p>
             <a:fld id="{2EA83CDC-A0E6-42C1-A015-39A6C54F2109}" type="slidenum">
               <a:rPr lang="en-US" smtClean="0"/>
-              <a:t>11</a:t>
+              <a:t>12</a:t>
             </a:fld>
             <a:endParaRPr lang="en-US"/>
           </a:p>
@@ -942,6 +945,93 @@
     <p:extLst>
       <p:ext uri="{BB962C8B-B14F-4D97-AF65-F5344CB8AC3E}">
         <p14:creationId xmlns:p14="http://schemas.microsoft.com/office/powerpoint/2010/main" val="1967963693"/>
+      </p:ext>
+    </p:extLst>
+  </p:cSld>
+  <p:clrMapOvr>
+    <a:masterClrMapping/>
+  </p:clrMapOvr>
+</p:notes>
+</file>
+
+<file path=ppt/notesSlides/notesSlide6.xml><?xml version="1.0" encoding="utf-8"?>
+<p:notes xmlns:a="http://schemas.openxmlformats.org/drawingml/2006/main" xmlns:r="http://schemas.openxmlformats.org/officeDocument/2006/relationships" xmlns:p="http://schemas.openxmlformats.org/presentationml/2006/main">
+  <p:cSld>
+    <p:spTree>
+      <p:nvGrpSpPr>
+        <p:cNvPr id="1" name=""/>
+        <p:cNvGrpSpPr/>
+        <p:nvPr/>
+      </p:nvGrpSpPr>
+      <p:grpSpPr>
+        <a:xfrm>
+          <a:off x="0" y="0"/>
+          <a:ext cx="0" cy="0"/>
+          <a:chOff x="0" y="0"/>
+          <a:chExt cx="0" cy="0"/>
+        </a:xfrm>
+      </p:grpSpPr>
+      <p:sp>
+        <p:nvSpPr>
+          <p:cNvPr id="2" name="Slide Image Placeholder 1"/>
+          <p:cNvSpPr>
+            <a:spLocks noGrp="1" noRot="1" noChangeAspect="1"/>
+          </p:cNvSpPr>
+          <p:nvPr>
+            <p:ph type="sldImg"/>
+          </p:nvPr>
+        </p:nvSpPr>
+        <p:spPr/>
+      </p:sp>
+      <p:sp>
+        <p:nvSpPr>
+          <p:cNvPr id="3" name="Notes Placeholder 2"/>
+          <p:cNvSpPr>
+            <a:spLocks noGrp="1"/>
+          </p:cNvSpPr>
+          <p:nvPr>
+            <p:ph type="body" idx="1"/>
+          </p:nvPr>
+        </p:nvSpPr>
+        <p:spPr/>
+        <p:txBody>
+          <a:bodyPr/>
+          <a:lstStyle/>
+          <a:p>
+            <a:r>
+              <a:rPr lang="en-US" dirty="0"/>
+              <a:t>Autonomy, dependency inversion, single responsibility, abstraction, encapsulation</a:t>
+            </a:r>
+          </a:p>
+        </p:txBody>
+      </p:sp>
+      <p:sp>
+        <p:nvSpPr>
+          <p:cNvPr id="4" name="Slide Number Placeholder 3"/>
+          <p:cNvSpPr>
+            <a:spLocks noGrp="1"/>
+          </p:cNvSpPr>
+          <p:nvPr>
+            <p:ph type="sldNum" sz="quarter" idx="10"/>
+          </p:nvPr>
+        </p:nvSpPr>
+        <p:spPr/>
+        <p:txBody>
+          <a:bodyPr/>
+          <a:lstStyle/>
+          <a:p>
+            <a:fld id="{2EA83CDC-A0E6-42C1-A015-39A6C54F2109}" type="slidenum">
+              <a:rPr lang="en-US" smtClean="0"/>
+              <a:t>33</a:t>
+            </a:fld>
+            <a:endParaRPr lang="en-US"/>
+          </a:p>
+        </p:txBody>
+      </p:sp>
+    </p:spTree>
+    <p:extLst>
+      <p:ext uri="{BB962C8B-B14F-4D97-AF65-F5344CB8AC3E}">
+        <p14:creationId xmlns:p14="http://schemas.microsoft.com/office/powerpoint/2010/main" val="1264769934"/>
       </p:ext>
     </p:extLst>
   </p:cSld>
@@ -1674,7 +1764,7 @@
             <a:fld id="{B61BEF0D-F0BB-DE4B-95CE-6DB70DBA9567}" type="datetimeFigureOut">
               <a:rPr lang="en-US" dirty="0"/>
               <a:pPr/>
-              <a:t>7/10/2017</a:t>
+              <a:t>7/11/2017</a:t>
             </a:fld>
             <a:endParaRPr lang="en-US" dirty="0"/>
           </a:p>
@@ -1922,7 +2012,7 @@
             <a:fld id="{B61BEF0D-F0BB-DE4B-95CE-6DB70DBA9567}" type="datetimeFigureOut">
               <a:rPr lang="en-US" dirty="0"/>
               <a:pPr/>
-              <a:t>7/10/2017</a:t>
+              <a:t>7/11/2017</a:t>
             </a:fld>
             <a:endParaRPr lang="en-US" dirty="0"/>
           </a:p>
@@ -2233,7 +2323,7 @@
             <a:fld id="{B61BEF0D-F0BB-DE4B-95CE-6DB70DBA9567}" type="datetimeFigureOut">
               <a:rPr lang="en-US" dirty="0"/>
               <a:pPr/>
-              <a:t>7/10/2017</a:t>
+              <a:t>7/11/2017</a:t>
             </a:fld>
             <a:endParaRPr lang="en-US" dirty="0"/>
           </a:p>
@@ -2571,7 +2661,7 @@
             <a:fld id="{B61BEF0D-F0BB-DE4B-95CE-6DB70DBA9567}" type="datetimeFigureOut">
               <a:rPr lang="en-US" dirty="0"/>
               <a:pPr/>
-              <a:t>7/10/2017</a:t>
+              <a:t>7/11/2017</a:t>
             </a:fld>
             <a:endParaRPr lang="en-US" dirty="0"/>
           </a:p>
@@ -2882,7 +2972,7 @@
             <a:fld id="{B61BEF0D-F0BB-DE4B-95CE-6DB70DBA9567}" type="datetimeFigureOut">
               <a:rPr lang="en-US" dirty="0"/>
               <a:pPr/>
-              <a:t>7/10/2017</a:t>
+              <a:t>7/11/2017</a:t>
             </a:fld>
             <a:endParaRPr lang="en-US" dirty="0"/>
           </a:p>
@@ -3272,7 +3362,7 @@
             <a:fld id="{B61BEF0D-F0BB-DE4B-95CE-6DB70DBA9567}" type="datetimeFigureOut">
               <a:rPr lang="en-US" dirty="0"/>
               <a:pPr/>
-              <a:t>7/10/2017</a:t>
+              <a:t>7/11/2017</a:t>
             </a:fld>
             <a:endParaRPr lang="en-US" dirty="0"/>
           </a:p>
@@ -3438,7 +3528,7 @@
           <a:p>
             <a:fld id="{55C6B4A9-1611-4792-9094-5F34BCA07E0B}" type="datetimeFigureOut">
               <a:rPr lang="en-US" dirty="0"/>
-              <a:t>7/10/2017</a:t>
+              <a:t>7/11/2017</a:t>
             </a:fld>
             <a:endParaRPr lang="en-US" dirty="0"/>
           </a:p>
@@ -3614,7 +3704,7 @@
             <a:fld id="{B61BEF0D-F0BB-DE4B-95CE-6DB70DBA9567}" type="datetimeFigureOut">
               <a:rPr lang="en-US" dirty="0"/>
               <a:pPr/>
-              <a:t>7/10/2017</a:t>
+              <a:t>7/11/2017</a:t>
             </a:fld>
             <a:endParaRPr lang="en-US" dirty="0"/>
           </a:p>
@@ -3787,7 +3877,7 @@
             <a:fld id="{B61BEF0D-F0BB-DE4B-95CE-6DB70DBA9567}" type="datetimeFigureOut">
               <a:rPr lang="en-US" dirty="0"/>
               <a:pPr/>
-              <a:t>7/10/2017</a:t>
+              <a:t>7/11/2017</a:t>
             </a:fld>
             <a:endParaRPr lang="en-US" dirty="0"/>
           </a:p>
@@ -4031,7 +4121,7 @@
             <a:fld id="{B61BEF0D-F0BB-DE4B-95CE-6DB70DBA9567}" type="datetimeFigureOut">
               <a:rPr lang="en-US" dirty="0"/>
               <a:pPr/>
-              <a:t>7/10/2017</a:t>
+              <a:t>7/11/2017</a:t>
             </a:fld>
             <a:endParaRPr lang="en-US" dirty="0"/>
           </a:p>
@@ -4259,7 +4349,7 @@
           <a:p>
             <a:fld id="{EB712588-04B1-427B-82EE-E8DB90309F08}" type="datetimeFigureOut">
               <a:rPr lang="en-US" dirty="0"/>
-              <a:t>7/10/2017</a:t>
+              <a:t>7/11/2017</a:t>
             </a:fld>
             <a:endParaRPr lang="en-US" dirty="0"/>
           </a:p>
@@ -4629,7 +4719,7 @@
             <a:fld id="{B61BEF0D-F0BB-DE4B-95CE-6DB70DBA9567}" type="datetimeFigureOut">
               <a:rPr lang="en-US" dirty="0"/>
               <a:pPr/>
-              <a:t>7/10/2017</a:t>
+              <a:t>7/11/2017</a:t>
             </a:fld>
             <a:endParaRPr lang="en-US" dirty="0"/>
           </a:p>
@@ -4749,7 +4839,7 @@
             <a:fld id="{B61BEF0D-F0BB-DE4B-95CE-6DB70DBA9567}" type="datetimeFigureOut">
               <a:rPr lang="en-US" dirty="0"/>
               <a:pPr/>
-              <a:t>7/10/2017</a:t>
+              <a:t>7/11/2017</a:t>
             </a:fld>
             <a:endParaRPr lang="en-US" dirty="0"/>
           </a:p>
@@ -4841,7 +4931,7 @@
             <a:fld id="{B61BEF0D-F0BB-DE4B-95CE-6DB70DBA9567}" type="datetimeFigureOut">
               <a:rPr lang="en-US" dirty="0"/>
               <a:pPr/>
-              <a:t>7/10/2017</a:t>
+              <a:t>7/11/2017</a:t>
             </a:fld>
             <a:endParaRPr lang="en-US" dirty="0"/>
           </a:p>
@@ -5092,7 +5182,7 @@
           <a:p>
             <a:fld id="{42A54C80-263E-416B-A8E0-580EDEADCBDC}" type="datetimeFigureOut">
               <a:rPr lang="en-US" dirty="0"/>
-              <a:t>7/10/2017</a:t>
+              <a:t>7/11/2017</a:t>
             </a:fld>
             <a:endParaRPr lang="en-US" dirty="0"/>
           </a:p>
@@ -5351,7 +5441,7 @@
             <a:fld id="{B61BEF0D-F0BB-DE4B-95CE-6DB70DBA9567}" type="datetimeFigureOut">
               <a:rPr lang="en-US" dirty="0"/>
               <a:pPr/>
-              <a:t>7/10/2017</a:t>
+              <a:t>7/11/2017</a:t>
             </a:fld>
             <a:endParaRPr lang="en-US" dirty="0"/>
           </a:p>
@@ -6091,7 +6181,7 @@
             <a:fld id="{B61BEF0D-F0BB-DE4B-95CE-6DB70DBA9567}" type="datetimeFigureOut">
               <a:rPr lang="en-US" dirty="0"/>
               <a:pPr/>
-              <a:t>7/10/2017</a:t>
+              <a:t>7/11/2017</a:t>
             </a:fld>
             <a:endParaRPr lang="en-US" dirty="0"/>
           </a:p>
@@ -6702,6 +6792,84 @@
           <a:p>
             <a:r>
               <a:rPr lang="en-US" dirty="0"/>
+              <a:t>Dependencies on Specific Servers</a:t>
+            </a:r>
+          </a:p>
+        </p:txBody>
+      </p:sp>
+      <p:pic>
+        <p:nvPicPr>
+          <p:cNvPr id="4" name="Content Placeholder 3"/>
+          <p:cNvPicPr>
+            <a:picLocks noGrp="1" noChangeAspect="1"/>
+          </p:cNvPicPr>
+          <p:nvPr>
+            <p:ph idx="1"/>
+          </p:nvPr>
+        </p:nvPicPr>
+        <p:blipFill>
+          <a:blip r:embed="rId3"/>
+          <a:stretch>
+            <a:fillRect/>
+          </a:stretch>
+        </p:blipFill>
+        <p:spPr>
+          <a:xfrm>
+            <a:off x="3172759" y="3195068"/>
+            <a:ext cx="2956816" cy="1379340"/>
+          </a:xfrm>
+          <a:prstGeom prst="rect">
+            <a:avLst/>
+          </a:prstGeom>
+        </p:spPr>
+      </p:pic>
+    </p:spTree>
+    <p:extLst>
+      <p:ext uri="{BB962C8B-B14F-4D97-AF65-F5344CB8AC3E}">
+        <p14:creationId xmlns:p14="http://schemas.microsoft.com/office/powerpoint/2010/main" val="3773381317"/>
+      </p:ext>
+    </p:extLst>
+  </p:cSld>
+  <p:clrMapOvr>
+    <a:masterClrMapping/>
+  </p:clrMapOvr>
+</p:sld>
+</file>
+
+<file path=ppt/slides/slide11.xml><?xml version="1.0" encoding="utf-8"?>
+<p:sld xmlns:a="http://schemas.openxmlformats.org/drawingml/2006/main" xmlns:r="http://schemas.openxmlformats.org/officeDocument/2006/relationships" xmlns:p="http://schemas.openxmlformats.org/presentationml/2006/main">
+  <p:cSld>
+    <p:spTree>
+      <p:nvGrpSpPr>
+        <p:cNvPr id="1" name=""/>
+        <p:cNvGrpSpPr/>
+        <p:nvPr/>
+      </p:nvGrpSpPr>
+      <p:grpSpPr>
+        <a:xfrm>
+          <a:off x="0" y="0"/>
+          <a:ext cx="0" cy="0"/>
+          <a:chOff x="0" y="0"/>
+          <a:chExt cx="0" cy="0"/>
+        </a:xfrm>
+      </p:grpSpPr>
+      <p:sp>
+        <p:nvSpPr>
+          <p:cNvPr id="2" name="Title 1"/>
+          <p:cNvSpPr>
+            <a:spLocks noGrp="1"/>
+          </p:cNvSpPr>
+          <p:nvPr>
+            <p:ph type="title"/>
+          </p:nvPr>
+        </p:nvSpPr>
+        <p:spPr/>
+        <p:txBody>
+          <a:bodyPr/>
+          <a:lstStyle/>
+          <a:p>
+            <a:r>
+              <a:rPr lang="en-US" dirty="0"/>
               <a:t>Adding another server?</a:t>
             </a:r>
           </a:p>
@@ -6746,7 +6914,7 @@
 </p:sld>
 </file>
 
-<file path=ppt/slides/slide11.xml><?xml version="1.0" encoding="utf-8"?>
+<file path=ppt/slides/slide12.xml><?xml version="1.0" encoding="utf-8"?>
 <p:sld xmlns:a="http://schemas.openxmlformats.org/drawingml/2006/main" xmlns:r="http://schemas.openxmlformats.org/officeDocument/2006/relationships" xmlns:p="http://schemas.openxmlformats.org/presentationml/2006/main">
   <p:cSld>
     <p:spTree>
@@ -6841,7 +7009,7 @@
 </p:sld>
 </file>
 
-<file path=ppt/slides/slide12.xml><?xml version="1.0" encoding="utf-8"?>
+<file path=ppt/slides/slide13.xml><?xml version="1.0" encoding="utf-8"?>
 <p:sld xmlns:a="http://schemas.openxmlformats.org/drawingml/2006/main" xmlns:r="http://schemas.openxmlformats.org/officeDocument/2006/relationships" xmlns:p="http://schemas.openxmlformats.org/presentationml/2006/main">
   <p:cSld>
     <p:spTree>
@@ -6936,160 +7104,6 @@
 </p:sld>
 </file>
 
-<file path=ppt/slides/slide13.xml><?xml version="1.0" encoding="utf-8"?>
-<p:sld xmlns:a="http://schemas.openxmlformats.org/drawingml/2006/main" xmlns:r="http://schemas.openxmlformats.org/officeDocument/2006/relationships" xmlns:p="http://schemas.openxmlformats.org/presentationml/2006/main">
-  <p:cSld>
-    <p:spTree>
-      <p:nvGrpSpPr>
-        <p:cNvPr id="1" name=""/>
-        <p:cNvGrpSpPr/>
-        <p:nvPr/>
-      </p:nvGrpSpPr>
-      <p:grpSpPr>
-        <a:xfrm>
-          <a:off x="0" y="0"/>
-          <a:ext cx="0" cy="0"/>
-          <a:chOff x="0" y="0"/>
-          <a:chExt cx="0" cy="0"/>
-        </a:xfrm>
-      </p:grpSpPr>
-      <p:sp>
-        <p:nvSpPr>
-          <p:cNvPr id="2" name="Title 1">
-            <a:extLst>
-              <a:ext uri="{FF2B5EF4-FFF2-40B4-BE49-F238E27FC236}">
-                <a16:creationId xmlns:a16="http://schemas.microsoft.com/office/drawing/2014/main" id="{7831FDE5-4B02-45BD-8116-1F39A4E39454}"/>
-              </a:ext>
-            </a:extLst>
-          </p:cNvPr>
-          <p:cNvSpPr>
-            <a:spLocks noGrp="1"/>
-          </p:cNvSpPr>
-          <p:nvPr>
-            <p:ph type="title"/>
-          </p:nvPr>
-        </p:nvSpPr>
-        <p:spPr>
-          <a:xfrm>
-            <a:off x="677334" y="628011"/>
-            <a:ext cx="8596668" cy="1320800"/>
-          </a:xfrm>
-        </p:spPr>
-        <p:txBody>
-          <a:bodyPr/>
-          <a:lstStyle/>
-          <a:p>
-            <a:r>
-              <a:rPr lang="en-US" dirty="0"/>
-              <a:t>Goals</a:t>
-            </a:r>
-          </a:p>
-        </p:txBody>
-      </p:sp>
-      <p:sp>
-        <p:nvSpPr>
-          <p:cNvPr id="3" name="Content Placeholder 2">
-            <a:extLst>
-              <a:ext uri="{FF2B5EF4-FFF2-40B4-BE49-F238E27FC236}">
-                <a16:creationId xmlns:a16="http://schemas.microsoft.com/office/drawing/2014/main" id="{637C7E15-E395-4CC8-88A3-5EE01D5A994E}"/>
-              </a:ext>
-            </a:extLst>
-          </p:cNvPr>
-          <p:cNvSpPr>
-            <a:spLocks noGrp="1"/>
-          </p:cNvSpPr>
-          <p:nvPr>
-            <p:ph idx="1"/>
-          </p:nvPr>
-        </p:nvSpPr>
-        <p:spPr/>
-        <p:txBody>
-          <a:bodyPr/>
-          <a:lstStyle/>
-          <a:p>
-            <a:r>
-              <a:rPr lang="en-US" dirty="0"/>
-              <a:t>100 % Automated deployment</a:t>
-            </a:r>
-          </a:p>
-          <a:p>
-            <a:r>
-              <a:rPr lang="en-US" dirty="0"/>
-              <a:t>100% uptime</a:t>
-            </a:r>
-          </a:p>
-          <a:p>
-            <a:pPr lvl="1"/>
-            <a:r>
-              <a:rPr lang="en-US" dirty="0"/>
-              <a:t>deploying components one instance at a time</a:t>
-            </a:r>
-          </a:p>
-          <a:p>
-            <a:pPr lvl="1"/>
-            <a:r>
-              <a:rPr lang="en-US" dirty="0"/>
-              <a:t>Multiple (usually two) versions running at a time</a:t>
-            </a:r>
-          </a:p>
-          <a:p>
-            <a:r>
-              <a:rPr lang="en-US" dirty="0"/>
-              <a:t>A fine granularity of what can be deployed independently</a:t>
-            </a:r>
-          </a:p>
-          <a:p>
-            <a:pPr lvl="1"/>
-            <a:r>
-              <a:rPr lang="en-US" dirty="0"/>
-              <a:t>Avoiding “microliths”</a:t>
-            </a:r>
-          </a:p>
-          <a:p>
-            <a:r>
-              <a:rPr lang="en-US" dirty="0"/>
-              <a:t>Metrics to decide when to scale out and in</a:t>
-            </a:r>
-          </a:p>
-          <a:p>
-            <a:pPr lvl="1"/>
-            <a:r>
-              <a:rPr lang="en-US" dirty="0"/>
-              <a:t>Health: differentiate between compensable and fatal </a:t>
-            </a:r>
-          </a:p>
-          <a:p>
-            <a:pPr lvl="1"/>
-            <a:r>
-              <a:rPr lang="en-US" dirty="0"/>
-              <a:t>Load: amount of work that can be done and is being done</a:t>
-            </a:r>
-          </a:p>
-          <a:p>
-            <a:r>
-              <a:rPr lang="en-US" dirty="0"/>
-              <a:t>Designed to support deployments not known at design-time</a:t>
-            </a:r>
-          </a:p>
-          <a:p>
-            <a:pPr lvl="1"/>
-            <a:endParaRPr lang="en-US" dirty="0"/>
-          </a:p>
-        </p:txBody>
-      </p:sp>
-    </p:spTree>
-    <p:extLst>
-      <p:ext uri="{BB962C8B-B14F-4D97-AF65-F5344CB8AC3E}">
-        <p14:creationId xmlns:p14="http://schemas.microsoft.com/office/powerpoint/2010/main" val="1429622881"/>
-      </p:ext>
-    </p:extLst>
-  </p:cSld>
-  <p:clrMapOvr>
-    <a:masterClrMapping/>
-  </p:clrMapOvr>
-</p:sld>
-</file>
-
 <file path=ppt/slides/slide14.xml><?xml version="1.0" encoding="utf-8"?>
 <p:sld xmlns:a="http://schemas.openxmlformats.org/drawingml/2006/main" xmlns:r="http://schemas.openxmlformats.org/officeDocument/2006/relationships" xmlns:p="http://schemas.openxmlformats.org/presentationml/2006/main">
   <p:cSld>
@@ -7109,7 +7123,13 @@
       </p:grpSpPr>
       <p:sp>
         <p:nvSpPr>
-          <p:cNvPr id="2" name="Title 1"/>
+          <p:cNvPr id="2" name="Title 1">
+            <a:extLst>
+              <a:ext uri="{FF2B5EF4-FFF2-40B4-BE49-F238E27FC236}">
+                <a16:creationId xmlns:a16="http://schemas.microsoft.com/office/drawing/2014/main" id="{7831FDE5-4B02-45BD-8116-1F39A4E39454}"/>
+              </a:ext>
+            </a:extLst>
+          </p:cNvPr>
           <p:cNvSpPr>
             <a:spLocks noGrp="1"/>
           </p:cNvSpPr>
@@ -7117,21 +7137,32 @@
             <p:ph type="title"/>
           </p:nvPr>
         </p:nvSpPr>
-        <p:spPr/>
-        <p:txBody>
-          <a:bodyPr/>
-          <a:lstStyle/>
-          <a:p>
-            <a:r>
-              <a:rPr lang="en-US" dirty="0"/>
-              <a:t>Beyond Round-Robin</a:t>
-            </a:r>
-          </a:p>
-        </p:txBody>
-      </p:sp>
-      <p:sp>
-        <p:nvSpPr>
-          <p:cNvPr id="3" name="Content Placeholder 2"/>
+        <p:spPr>
+          <a:xfrm>
+            <a:off x="677334" y="628011"/>
+            <a:ext cx="8596668" cy="1320800"/>
+          </a:xfrm>
+        </p:spPr>
+        <p:txBody>
+          <a:bodyPr/>
+          <a:lstStyle/>
+          <a:p>
+            <a:r>
+              <a:rPr lang="en-US" dirty="0"/>
+              <a:t>Goals</a:t>
+            </a:r>
+          </a:p>
+        </p:txBody>
+      </p:sp>
+      <p:sp>
+        <p:nvSpPr>
+          <p:cNvPr id="3" name="Content Placeholder 2">
+            <a:extLst>
+              <a:ext uri="{FF2B5EF4-FFF2-40B4-BE49-F238E27FC236}">
+                <a16:creationId xmlns:a16="http://schemas.microsoft.com/office/drawing/2014/main" id="{637C7E15-E395-4CC8-88A3-5EE01D5A994E}"/>
+              </a:ext>
+            </a:extLst>
+          </p:cNvPr>
           <p:cNvSpPr>
             <a:spLocks noGrp="1"/>
           </p:cNvSpPr>
@@ -7146,33 +7177,78 @@
           <a:p>
             <a:r>
               <a:rPr lang="en-US" dirty="0"/>
-              <a:t>Distribute work based on load is more efficient</a:t>
-            </a:r>
-          </a:p>
-          <a:p>
-            <a:r>
-              <a:rPr lang="en-US" dirty="0"/>
-              <a:t>Requires “load” to be known or calculated</a:t>
-            </a:r>
-          </a:p>
-          <a:p>
-            <a:r>
-              <a:rPr lang="en-US" dirty="0"/>
-              <a:t>Shared/containerized environments, “load” is service-specific</a:t>
-            </a:r>
-          </a:p>
-          <a:p>
-            <a:r>
-              <a:rPr lang="en-US" dirty="0"/>
-              <a:t>Report load for each service/application.</a:t>
-            </a:r>
+              <a:t>100 % Automated deployment</a:t>
+            </a:r>
+          </a:p>
+          <a:p>
+            <a:r>
+              <a:rPr lang="en-US" dirty="0"/>
+              <a:t>100% uptime</a:t>
+            </a:r>
+          </a:p>
+          <a:p>
+            <a:pPr lvl="1"/>
+            <a:r>
+              <a:rPr lang="en-US" dirty="0"/>
+              <a:t>deploying components one instance at a time</a:t>
+            </a:r>
+          </a:p>
+          <a:p>
+            <a:pPr lvl="1"/>
+            <a:r>
+              <a:rPr lang="en-US" dirty="0"/>
+              <a:t>Multiple (usually two) versions running at a time</a:t>
+            </a:r>
+          </a:p>
+          <a:p>
+            <a:r>
+              <a:rPr lang="en-US" dirty="0"/>
+              <a:t>A fine granularity of what can be deployed independently</a:t>
+            </a:r>
+          </a:p>
+          <a:p>
+            <a:pPr lvl="1"/>
+            <a:r>
+              <a:rPr lang="en-US" dirty="0"/>
+              <a:t>Avoiding “microliths”</a:t>
+            </a:r>
+          </a:p>
+          <a:p>
+            <a:r>
+              <a:rPr lang="en-US" dirty="0"/>
+              <a:t>Metrics to decide when to scale out and in</a:t>
+            </a:r>
+          </a:p>
+          <a:p>
+            <a:pPr lvl="1"/>
+            <a:r>
+              <a:rPr lang="en-US" dirty="0"/>
+              <a:t>Health: differentiate between compensable and fatal </a:t>
+            </a:r>
+          </a:p>
+          <a:p>
+            <a:pPr lvl="1"/>
+            <a:r>
+              <a:rPr lang="en-US" dirty="0"/>
+              <a:t>Load: amount of work that can be done and is being done</a:t>
+            </a:r>
+          </a:p>
+          <a:p>
+            <a:r>
+              <a:rPr lang="en-US" dirty="0"/>
+              <a:t>Designed to support deployments not known at design-time</a:t>
+            </a:r>
+          </a:p>
+          <a:p>
+            <a:pPr lvl="1"/>
+            <a:endParaRPr lang="en-US" dirty="0"/>
           </a:p>
         </p:txBody>
       </p:sp>
     </p:spTree>
     <p:extLst>
       <p:ext uri="{BB962C8B-B14F-4D97-AF65-F5344CB8AC3E}">
-        <p14:creationId xmlns:p14="http://schemas.microsoft.com/office/powerpoint/2010/main" val="615934879"/>
+        <p14:creationId xmlns:p14="http://schemas.microsoft.com/office/powerpoint/2010/main" val="1429622881"/>
       </p:ext>
     </p:extLst>
   </p:cSld>
@@ -7201,7 +7277,13 @@
       </p:grpSpPr>
       <p:sp>
         <p:nvSpPr>
-          <p:cNvPr id="2" name="Title 1"/>
+          <p:cNvPr id="2" name="Title 1">
+            <a:extLst>
+              <a:ext uri="{FF2B5EF4-FFF2-40B4-BE49-F238E27FC236}">
+                <a16:creationId xmlns:a16="http://schemas.microsoft.com/office/drawing/2014/main" id="{C4006DEC-85E4-4944-B9B2-66E7159BEFFA}"/>
+              </a:ext>
+            </a:extLst>
+          </p:cNvPr>
           <p:cNvSpPr>
             <a:spLocks noGrp="1"/>
           </p:cNvSpPr>
@@ -7216,105 +7298,40 @@
           <a:p>
             <a:r>
               <a:rPr lang="en-US" dirty="0"/>
-              <a:t>Logging</a:t>
-            </a:r>
-          </a:p>
-        </p:txBody>
-      </p:sp>
-      <p:sp>
-        <p:nvSpPr>
-          <p:cNvPr id="3" name="Content Placeholder 2"/>
-          <p:cNvSpPr>
-            <a:spLocks noGrp="1"/>
-          </p:cNvSpPr>
-          <p:nvPr>
-            <p:ph idx="1"/>
-          </p:nvPr>
-        </p:nvSpPr>
-        <p:spPr/>
-        <p:txBody>
-          <a:bodyPr/>
-          <a:lstStyle/>
-          <a:p>
-            <a:r>
-              <a:rPr lang="en-US" dirty="0"/>
-              <a:t>Things to log</a:t>
-            </a:r>
-          </a:p>
-          <a:p>
-            <a:pPr lvl="1"/>
-            <a:r>
-              <a:rPr lang="en-US" dirty="0"/>
-              <a:t>Contexts</a:t>
-            </a:r>
-          </a:p>
-          <a:p>
-            <a:pPr lvl="2"/>
-            <a:r>
-              <a:rPr lang="en-US" dirty="0"/>
-              <a:t>Per task</a:t>
-            </a:r>
-          </a:p>
-          <a:p>
-            <a:pPr lvl="2"/>
-            <a:r>
-              <a:rPr lang="en-US" dirty="0"/>
-              <a:t>Per request</a:t>
-            </a:r>
-          </a:p>
-          <a:p>
-            <a:pPr lvl="1"/>
-            <a:r>
-              <a:rPr lang="en-US" dirty="0"/>
-              <a:t>Date &amp; time</a:t>
-            </a:r>
-          </a:p>
-          <a:p>
-            <a:pPr lvl="1"/>
-            <a:r>
-              <a:rPr lang="en-US" dirty="0"/>
-              <a:t>Cost (</a:t>
-            </a:r>
-            <a:r>
-              <a:rPr lang="en-US" i="1" dirty="0"/>
-              <a:t>completed</a:t>
-            </a:r>
-            <a:r>
-              <a:rPr lang="en-US" dirty="0"/>
-              <a:t> log entries)</a:t>
-            </a:r>
-          </a:p>
-          <a:p>
-            <a:pPr lvl="1"/>
-            <a:r>
-              <a:rPr lang="en-US" dirty="0"/>
-              <a:t>Failed Assertions</a:t>
-            </a:r>
-          </a:p>
-          <a:p>
-            <a:pPr lvl="1"/>
-            <a:r>
-              <a:rPr lang="en-US" dirty="0"/>
-              <a:t>Exception</a:t>
-            </a:r>
-          </a:p>
-          <a:p>
-            <a:pPr lvl="1"/>
-            <a:r>
-              <a:rPr lang="en-US" dirty="0"/>
-              <a:t>Differentiate between errors/exceptions compensated for.</a:t>
-            </a:r>
-          </a:p>
-          <a:p>
-            <a:pPr lvl="1"/>
-            <a:endParaRPr lang="en-US" dirty="0"/>
+              <a:t>Avoiding Roadblocks</a:t>
+            </a:r>
+          </a:p>
+        </p:txBody>
+      </p:sp>
+      <p:sp>
+        <p:nvSpPr>
+          <p:cNvPr id="3" name="Text Placeholder 2">
+            <a:extLst>
+              <a:ext uri="{FF2B5EF4-FFF2-40B4-BE49-F238E27FC236}">
+                <a16:creationId xmlns:a16="http://schemas.microsoft.com/office/drawing/2014/main" id="{D804BDFB-63AD-407B-ACCB-B5AB1015BA26}"/>
+              </a:ext>
+            </a:extLst>
+          </p:cNvPr>
+          <p:cNvSpPr>
+            <a:spLocks noGrp="1"/>
+          </p:cNvSpPr>
+          <p:nvPr>
+            <p:ph type="body" idx="1"/>
+          </p:nvPr>
+        </p:nvSpPr>
+        <p:spPr/>
+        <p:txBody>
+          <a:bodyPr/>
+          <a:lstStyle/>
+          <a:p>
+            <a:endParaRPr lang="en-US"/>
           </a:p>
         </p:txBody>
       </p:sp>
     </p:spTree>
     <p:extLst>
       <p:ext uri="{BB962C8B-B14F-4D97-AF65-F5344CB8AC3E}">
-        <p14:creationId xmlns:p14="http://schemas.microsoft.com/office/powerpoint/2010/main" val="337262675"/>
+        <p14:creationId xmlns:p14="http://schemas.microsoft.com/office/powerpoint/2010/main" val="2162232303"/>
       </p:ext>
     </p:extLst>
   </p:cSld>
@@ -7358,7 +7375,7 @@
           <a:p>
             <a:r>
               <a:rPr lang="en-US" dirty="0"/>
-              <a:t>Configuration</a:t>
+              <a:t>Beyond Round-Robin</a:t>
             </a:r>
           </a:p>
         </p:txBody>
@@ -7379,34 +7396,26 @@
           <a:lstStyle/>
           <a:p>
             <a:r>
-              <a:rPr lang="en-US" dirty="0" err="1"/>
-              <a:t>App.config</a:t>
-            </a:r>
-            <a:r>
-              <a:rPr lang="en-US" dirty="0"/>
-              <a:t> may not make sense</a:t>
-            </a:r>
-          </a:p>
-          <a:p>
-            <a:r>
-              <a:rPr lang="en-US" dirty="0"/>
-              <a:t>Centralized configuration</a:t>
-            </a:r>
-          </a:p>
-          <a:p>
-            <a:r>
-              <a:rPr lang="en-US" dirty="0"/>
-              <a:t>Scaling out pushes unique configuration</a:t>
-            </a:r>
-          </a:p>
-          <a:p>
-            <a:r>
-              <a:rPr lang="en-US" dirty="0" err="1"/>
-              <a:t>Etc</a:t>
-            </a:r>
-            <a:r>
-              <a:rPr lang="en-US" dirty="0"/>
-              <a:t>…</a:t>
+              <a:rPr lang="en-US" dirty="0"/>
+              <a:t>Distribute work based on load is more efficient</a:t>
+            </a:r>
+          </a:p>
+          <a:p>
+            <a:r>
+              <a:rPr lang="en-US" dirty="0"/>
+              <a:t>Requires “load” to be known or calculated</a:t>
+            </a:r>
+          </a:p>
+          <a:p>
+            <a:r>
+              <a:rPr lang="en-US" dirty="0"/>
+              <a:t>Shared/containerized environments, “load” is service-specific</a:t>
+            </a:r>
+          </a:p>
+          <a:p>
+            <a:r>
+              <a:rPr lang="en-US" dirty="0"/>
+              <a:t>Report load for each service/application.</a:t>
             </a:r>
           </a:p>
         </p:txBody>
@@ -7414,7 +7423,7 @@
     </p:spTree>
     <p:extLst>
       <p:ext uri="{BB962C8B-B14F-4D97-AF65-F5344CB8AC3E}">
-        <p14:creationId xmlns:p14="http://schemas.microsoft.com/office/powerpoint/2010/main" val="3673845808"/>
+        <p14:creationId xmlns:p14="http://schemas.microsoft.com/office/powerpoint/2010/main" val="615934879"/>
       </p:ext>
     </p:extLst>
   </p:cSld>
@@ -7458,7 +7467,7 @@
           <a:p>
             <a:r>
               <a:rPr lang="en-US" dirty="0"/>
-              <a:t>Service Resolution</a:t>
+              <a:t>Logging</a:t>
             </a:r>
           </a:p>
         </p:txBody>
@@ -7480,21 +7489,83 @@
           <a:p>
             <a:r>
               <a:rPr lang="en-US" dirty="0"/>
-              <a:t>Invocation of other services</a:t>
-            </a:r>
-          </a:p>
-          <a:p>
-            <a:r>
-              <a:rPr lang="en-US" dirty="0"/>
-              <a:t>Invocation via abstraction, like name</a:t>
-            </a:r>
+              <a:t>Things to log</a:t>
+            </a:r>
+          </a:p>
+          <a:p>
+            <a:pPr lvl="1"/>
+            <a:r>
+              <a:rPr lang="en-US" dirty="0"/>
+              <a:t>Contexts</a:t>
+            </a:r>
+          </a:p>
+          <a:p>
+            <a:pPr lvl="2"/>
+            <a:r>
+              <a:rPr lang="en-US" dirty="0"/>
+              <a:t>Per task</a:t>
+            </a:r>
+          </a:p>
+          <a:p>
+            <a:pPr lvl="2"/>
+            <a:r>
+              <a:rPr lang="en-US" dirty="0"/>
+              <a:t>Per request</a:t>
+            </a:r>
+          </a:p>
+          <a:p>
+            <a:pPr lvl="1"/>
+            <a:r>
+              <a:rPr lang="en-US" dirty="0"/>
+              <a:t>Date &amp; time</a:t>
+            </a:r>
+          </a:p>
+          <a:p>
+            <a:pPr lvl="1"/>
+            <a:r>
+              <a:rPr lang="en-US" dirty="0"/>
+              <a:t>Cost (</a:t>
+            </a:r>
+            <a:r>
+              <a:rPr lang="en-US" i="1" dirty="0"/>
+              <a:t>completed</a:t>
+            </a:r>
+            <a:r>
+              <a:rPr lang="en-US" dirty="0"/>
+              <a:t> log entries)</a:t>
+            </a:r>
+          </a:p>
+          <a:p>
+            <a:pPr lvl="1"/>
+            <a:r>
+              <a:rPr lang="en-US" dirty="0"/>
+              <a:t>Failed Assertions</a:t>
+            </a:r>
+          </a:p>
+          <a:p>
+            <a:pPr lvl="1"/>
+            <a:r>
+              <a:rPr lang="en-US" dirty="0"/>
+              <a:t>Exception</a:t>
+            </a:r>
+          </a:p>
+          <a:p>
+            <a:pPr lvl="1"/>
+            <a:r>
+              <a:rPr lang="en-US" dirty="0"/>
+              <a:t>Differentiate between errors/exceptions compensated for.</a:t>
+            </a:r>
+          </a:p>
+          <a:p>
+            <a:pPr lvl="1"/>
+            <a:endParaRPr lang="en-US" dirty="0"/>
           </a:p>
         </p:txBody>
       </p:sp>
     </p:spTree>
     <p:extLst>
       <p:ext uri="{BB962C8B-B14F-4D97-AF65-F5344CB8AC3E}">
-        <p14:creationId xmlns:p14="http://schemas.microsoft.com/office/powerpoint/2010/main" val="2593339875"/>
+        <p14:creationId xmlns:p14="http://schemas.microsoft.com/office/powerpoint/2010/main" val="337262675"/>
       </p:ext>
     </p:extLst>
   </p:cSld>
@@ -7538,7 +7609,7 @@
           <a:p>
             <a:r>
               <a:rPr lang="en-US" dirty="0"/>
-              <a:t>Service Resolution Alternatives</a:t>
+              <a:t>Configuration</a:t>
             </a:r>
           </a:p>
         </p:txBody>
@@ -7553,50 +7624,48 @@
             <p:ph idx="1"/>
           </p:nvPr>
         </p:nvSpPr>
-        <p:spPr>
-          <a:xfrm>
-            <a:off x="677334" y="2182020"/>
-            <a:ext cx="8596668" cy="3880773"/>
-          </a:xfrm>
-        </p:spPr>
-        <p:txBody>
-          <a:bodyPr/>
-          <a:lstStyle/>
-          <a:p>
-            <a:r>
-              <a:rPr lang="en-US" dirty="0"/>
-              <a:t>Load balancer</a:t>
-            </a:r>
-          </a:p>
-          <a:p>
-            <a:r>
-              <a:rPr lang="en-US" dirty="0"/>
-              <a:t>Platforms</a:t>
-            </a:r>
-          </a:p>
-          <a:p>
-            <a:pPr lvl="1"/>
-            <a:r>
-              <a:rPr lang="en-US" dirty="0"/>
-              <a:t>Service Fabric</a:t>
-            </a:r>
-          </a:p>
-          <a:p>
-            <a:r>
-              <a:rPr lang="en-US" dirty="0"/>
-              <a:t>Frameworks</a:t>
-            </a:r>
-          </a:p>
-          <a:p>
-            <a:pPr lvl="1"/>
-            <a:endParaRPr lang="en-US" dirty="0"/>
+        <p:spPr/>
+        <p:txBody>
+          <a:bodyPr/>
+          <a:lstStyle/>
+          <a:p>
+            <a:r>
+              <a:rPr lang="en-US" dirty="0" err="1"/>
+              <a:t>App.config</a:t>
+            </a:r>
+            <a:r>
+              <a:rPr lang="en-US" dirty="0"/>
+              <a:t> may not make sense</a:t>
+            </a:r>
+          </a:p>
+          <a:p>
+            <a:r>
+              <a:rPr lang="en-US" dirty="0"/>
+              <a:t>Centralized configuration</a:t>
+            </a:r>
+          </a:p>
+          <a:p>
+            <a:r>
+              <a:rPr lang="en-US" dirty="0"/>
+              <a:t>Scaling out pushes unique configuration</a:t>
+            </a:r>
+          </a:p>
+          <a:p>
+            <a:r>
+              <a:rPr lang="en-US" dirty="0" err="1"/>
+              <a:t>Etc</a:t>
+            </a:r>
+            <a:r>
+              <a:rPr lang="en-US" dirty="0"/>
+              <a:t>…</a:t>
+            </a:r>
           </a:p>
         </p:txBody>
       </p:sp>
     </p:spTree>
     <p:extLst>
       <p:ext uri="{BB962C8B-B14F-4D97-AF65-F5344CB8AC3E}">
-        <p14:creationId xmlns:p14="http://schemas.microsoft.com/office/powerpoint/2010/main" val="3622675734"/>
+        <p14:creationId xmlns:p14="http://schemas.microsoft.com/office/powerpoint/2010/main" val="3673845808"/>
       </p:ext>
     </p:extLst>
   </p:cSld>
@@ -7640,7 +7709,7 @@
           <a:p>
             <a:r>
               <a:rPr lang="en-US" dirty="0"/>
-              <a:t>Stateless</a:t>
+              <a:t>Service Resolution</a:t>
             </a:r>
           </a:p>
         </p:txBody>
@@ -7662,60 +7731,13 @@
           <a:p>
             <a:r>
               <a:rPr lang="en-US" dirty="0"/>
-              <a:t>“State” is only in-memory state</a:t>
-            </a:r>
-          </a:p>
-          <a:p>
-            <a:r>
-              <a:rPr lang="en-US" dirty="0"/>
-              <a:t>Problems with </a:t>
-            </a:r>
-            <a:r>
-              <a:rPr lang="en-US" dirty="0" err="1"/>
-              <a:t>stateful</a:t>
-            </a:r>
-            <a:endParaRPr lang="en-US" dirty="0"/>
-          </a:p>
-          <a:p>
-            <a:pPr lvl="1"/>
-            <a:r>
-              <a:rPr lang="en-US" dirty="0"/>
-              <a:t>State couples execution to that specific process and sometimes thread</a:t>
-            </a:r>
-          </a:p>
-          <a:p>
-            <a:pPr lvl="1"/>
-            <a:r>
-              <a:rPr lang="en-US" dirty="0"/>
-              <a:t>If long-running or asynchronous, must return to the one process</a:t>
-            </a:r>
-          </a:p>
-          <a:p>
-            <a:pPr lvl="2"/>
-            <a:r>
-              <a:rPr lang="en-US" dirty="0"/>
-              <a:t>No scaling</a:t>
-            </a:r>
-          </a:p>
-          <a:p>
-            <a:r>
-              <a:rPr lang="en-US" dirty="0"/>
-              <a:t>Being stateless</a:t>
-            </a:r>
-          </a:p>
-          <a:p>
-            <a:pPr lvl="1"/>
-            <a:r>
-              <a:rPr lang="en-US" dirty="0"/>
-              <a:t>Deferring </a:t>
-            </a:r>
-            <a:r>
-              <a:rPr lang="en-US" i="1" dirty="0"/>
-              <a:t>state</a:t>
-            </a:r>
-            <a:r>
-              <a:rPr lang="en-US" dirty="0"/>
-              <a:t> to some persistence mechanism for other instances to retrieve</a:t>
+              <a:t>Invocation of other services</a:t>
+            </a:r>
+          </a:p>
+          <a:p>
+            <a:r>
+              <a:rPr lang="en-US" dirty="0"/>
+              <a:t>Invocation via abstraction, like name</a:t>
             </a:r>
           </a:p>
         </p:txBody>
@@ -7723,7 +7745,7 @@
     </p:spTree>
     <p:extLst>
       <p:ext uri="{BB962C8B-B14F-4D97-AF65-F5344CB8AC3E}">
-        <p14:creationId xmlns:p14="http://schemas.microsoft.com/office/powerpoint/2010/main" val="1799702444"/>
+        <p14:creationId xmlns:p14="http://schemas.microsoft.com/office/powerpoint/2010/main" val="2593339875"/>
       </p:ext>
     </p:extLst>
   </p:cSld>
@@ -7933,6 +7955,235 @@
           <a:chExt cx="0" cy="0"/>
         </a:xfrm>
       </p:grpSpPr>
+      <p:sp>
+        <p:nvSpPr>
+          <p:cNvPr id="2" name="Title 1"/>
+          <p:cNvSpPr>
+            <a:spLocks noGrp="1"/>
+          </p:cNvSpPr>
+          <p:nvPr>
+            <p:ph type="title"/>
+          </p:nvPr>
+        </p:nvSpPr>
+        <p:spPr/>
+        <p:txBody>
+          <a:bodyPr/>
+          <a:lstStyle/>
+          <a:p>
+            <a:r>
+              <a:rPr lang="en-US" dirty="0"/>
+              <a:t>Service Resolution Alternatives</a:t>
+            </a:r>
+          </a:p>
+        </p:txBody>
+      </p:sp>
+      <p:sp>
+        <p:nvSpPr>
+          <p:cNvPr id="3" name="Content Placeholder 2"/>
+          <p:cNvSpPr>
+            <a:spLocks noGrp="1"/>
+          </p:cNvSpPr>
+          <p:nvPr>
+            <p:ph idx="1"/>
+          </p:nvPr>
+        </p:nvSpPr>
+        <p:spPr>
+          <a:xfrm>
+            <a:off x="677334" y="2182020"/>
+            <a:ext cx="8596668" cy="3880773"/>
+          </a:xfrm>
+        </p:spPr>
+        <p:txBody>
+          <a:bodyPr/>
+          <a:lstStyle/>
+          <a:p>
+            <a:r>
+              <a:rPr lang="en-US" dirty="0"/>
+              <a:t>Load balancer</a:t>
+            </a:r>
+          </a:p>
+          <a:p>
+            <a:r>
+              <a:rPr lang="en-US" dirty="0"/>
+              <a:t>Platforms</a:t>
+            </a:r>
+          </a:p>
+          <a:p>
+            <a:pPr lvl="1"/>
+            <a:r>
+              <a:rPr lang="en-US" dirty="0"/>
+              <a:t>Service Fabric</a:t>
+            </a:r>
+          </a:p>
+          <a:p>
+            <a:r>
+              <a:rPr lang="en-US" dirty="0"/>
+              <a:t>Frameworks</a:t>
+            </a:r>
+          </a:p>
+          <a:p>
+            <a:pPr lvl="1"/>
+            <a:endParaRPr lang="en-US" dirty="0"/>
+          </a:p>
+        </p:txBody>
+      </p:sp>
+    </p:spTree>
+    <p:extLst>
+      <p:ext uri="{BB962C8B-B14F-4D97-AF65-F5344CB8AC3E}">
+        <p14:creationId xmlns:p14="http://schemas.microsoft.com/office/powerpoint/2010/main" val="3622675734"/>
+      </p:ext>
+    </p:extLst>
+  </p:cSld>
+  <p:clrMapOvr>
+    <a:masterClrMapping/>
+  </p:clrMapOvr>
+</p:sld>
+</file>
+
+<file path=ppt/slides/slide21.xml><?xml version="1.0" encoding="utf-8"?>
+<p:sld xmlns:a="http://schemas.openxmlformats.org/drawingml/2006/main" xmlns:r="http://schemas.openxmlformats.org/officeDocument/2006/relationships" xmlns:p="http://schemas.openxmlformats.org/presentationml/2006/main">
+  <p:cSld>
+    <p:spTree>
+      <p:nvGrpSpPr>
+        <p:cNvPr id="1" name=""/>
+        <p:cNvGrpSpPr/>
+        <p:nvPr/>
+      </p:nvGrpSpPr>
+      <p:grpSpPr>
+        <a:xfrm>
+          <a:off x="0" y="0"/>
+          <a:ext cx="0" cy="0"/>
+          <a:chOff x="0" y="0"/>
+          <a:chExt cx="0" cy="0"/>
+        </a:xfrm>
+      </p:grpSpPr>
+      <p:sp>
+        <p:nvSpPr>
+          <p:cNvPr id="2" name="Title 1"/>
+          <p:cNvSpPr>
+            <a:spLocks noGrp="1"/>
+          </p:cNvSpPr>
+          <p:nvPr>
+            <p:ph type="title"/>
+          </p:nvPr>
+        </p:nvSpPr>
+        <p:spPr/>
+        <p:txBody>
+          <a:bodyPr/>
+          <a:lstStyle/>
+          <a:p>
+            <a:r>
+              <a:rPr lang="en-US" dirty="0"/>
+              <a:t>Stateless</a:t>
+            </a:r>
+          </a:p>
+        </p:txBody>
+      </p:sp>
+      <p:sp>
+        <p:nvSpPr>
+          <p:cNvPr id="3" name="Content Placeholder 2"/>
+          <p:cNvSpPr>
+            <a:spLocks noGrp="1"/>
+          </p:cNvSpPr>
+          <p:nvPr>
+            <p:ph idx="1"/>
+          </p:nvPr>
+        </p:nvSpPr>
+        <p:spPr/>
+        <p:txBody>
+          <a:bodyPr/>
+          <a:lstStyle/>
+          <a:p>
+            <a:r>
+              <a:rPr lang="en-US" dirty="0"/>
+              <a:t>“State” is only in-memory state</a:t>
+            </a:r>
+          </a:p>
+          <a:p>
+            <a:r>
+              <a:rPr lang="en-US" dirty="0"/>
+              <a:t>Problems with </a:t>
+            </a:r>
+            <a:r>
+              <a:rPr lang="en-US" dirty="0" err="1"/>
+              <a:t>stateful</a:t>
+            </a:r>
+            <a:endParaRPr lang="en-US" dirty="0"/>
+          </a:p>
+          <a:p>
+            <a:pPr lvl="1"/>
+            <a:r>
+              <a:rPr lang="en-US" dirty="0"/>
+              <a:t>State couples execution to that specific process and sometimes thread</a:t>
+            </a:r>
+          </a:p>
+          <a:p>
+            <a:pPr lvl="1"/>
+            <a:r>
+              <a:rPr lang="en-US" dirty="0"/>
+              <a:t>If long-running or asynchronous, must return to the one process</a:t>
+            </a:r>
+          </a:p>
+          <a:p>
+            <a:pPr lvl="2"/>
+            <a:r>
+              <a:rPr lang="en-US" dirty="0"/>
+              <a:t>No scaling</a:t>
+            </a:r>
+          </a:p>
+          <a:p>
+            <a:r>
+              <a:rPr lang="en-US" dirty="0"/>
+              <a:t>Being stateless</a:t>
+            </a:r>
+          </a:p>
+          <a:p>
+            <a:pPr lvl="1"/>
+            <a:r>
+              <a:rPr lang="en-US" dirty="0"/>
+              <a:t>Deferring </a:t>
+            </a:r>
+            <a:r>
+              <a:rPr lang="en-US" i="1" dirty="0"/>
+              <a:t>state</a:t>
+            </a:r>
+            <a:r>
+              <a:rPr lang="en-US" dirty="0"/>
+              <a:t> to some persistence mechanism for other instances to retrieve</a:t>
+            </a:r>
+          </a:p>
+        </p:txBody>
+      </p:sp>
+    </p:spTree>
+    <p:extLst>
+      <p:ext uri="{BB962C8B-B14F-4D97-AF65-F5344CB8AC3E}">
+        <p14:creationId xmlns:p14="http://schemas.microsoft.com/office/powerpoint/2010/main" val="1799702444"/>
+      </p:ext>
+    </p:extLst>
+  </p:cSld>
+  <p:clrMapOvr>
+    <a:masterClrMapping/>
+  </p:clrMapOvr>
+</p:sld>
+</file>
+
+<file path=ppt/slides/slide22.xml><?xml version="1.0" encoding="utf-8"?>
+<p:sld xmlns:a="http://schemas.openxmlformats.org/drawingml/2006/main" xmlns:r="http://schemas.openxmlformats.org/officeDocument/2006/relationships" xmlns:p="http://schemas.openxmlformats.org/presentationml/2006/main">
+  <p:cSld>
+    <p:spTree>
+      <p:nvGrpSpPr>
+        <p:cNvPr id="1" name=""/>
+        <p:cNvGrpSpPr/>
+        <p:nvPr/>
+      </p:nvGrpSpPr>
+      <p:grpSpPr>
+        <a:xfrm>
+          <a:off x="0" y="0"/>
+          <a:ext cx="0" cy="0"/>
+          <a:chOff x="0" y="0"/>
+          <a:chExt cx="0" cy="0"/>
+        </a:xfrm>
+      </p:grpSpPr>
       <p:pic>
         <p:nvPicPr>
           <p:cNvPr id="4" name="Picture 3">
@@ -8043,7 +8294,7 @@
 </p:sld>
 </file>
 
-<file path=ppt/slides/slide21.xml><?xml version="1.0" encoding="utf-8"?>
+<file path=ppt/slides/slide23.xml><?xml version="1.0" encoding="utf-8"?>
 <p:sld xmlns:a="http://schemas.openxmlformats.org/drawingml/2006/main" xmlns:r="http://schemas.openxmlformats.org/officeDocument/2006/relationships" xmlns:p="http://schemas.openxmlformats.org/presentationml/2006/main">
   <p:cSld>
     <p:spTree>
@@ -8158,7 +8409,7 @@
 </p:sld>
 </file>
 
-<file path=ppt/slides/slide22.xml><?xml version="1.0" encoding="utf-8"?>
+<file path=ppt/slides/slide24.xml><?xml version="1.0" encoding="utf-8"?>
 <p:sld xmlns:a="http://schemas.openxmlformats.org/drawingml/2006/main" xmlns:r="http://schemas.openxmlformats.org/officeDocument/2006/relationships" xmlns:p="http://schemas.openxmlformats.org/presentationml/2006/main">
   <p:cSld>
     <p:spTree>
@@ -8229,7 +8480,7 @@
 </p:sld>
 </file>
 
-<file path=ppt/slides/slide23.xml><?xml version="1.0" encoding="utf-8"?>
+<file path=ppt/slides/slide25.xml><?xml version="1.0" encoding="utf-8"?>
 <p:sld xmlns:a="http://schemas.openxmlformats.org/drawingml/2006/main" xmlns:r="http://schemas.openxmlformats.org/officeDocument/2006/relationships" xmlns:p="http://schemas.openxmlformats.org/presentationml/2006/main">
   <p:cSld>
     <p:spTree>
@@ -8333,7 +8584,7 @@
 </p:sld>
 </file>
 
-<file path=ppt/slides/slide24.xml><?xml version="1.0" encoding="utf-8"?>
+<file path=ppt/slides/slide26.xml><?xml version="1.0" encoding="utf-8"?>
 <p:sld xmlns:a="http://schemas.openxmlformats.org/drawingml/2006/main" xmlns:r="http://schemas.openxmlformats.org/officeDocument/2006/relationships" xmlns:p="http://schemas.openxmlformats.org/presentationml/2006/main">
   <p:cSld>
     <p:spTree>
@@ -8441,170 +8692,6 @@
 </p:sld>
 </file>
 
-<file path=ppt/slides/slide25.xml><?xml version="1.0" encoding="utf-8"?>
-<p:sld xmlns:a="http://schemas.openxmlformats.org/drawingml/2006/main" xmlns:r="http://schemas.openxmlformats.org/officeDocument/2006/relationships" xmlns:p="http://schemas.openxmlformats.org/presentationml/2006/main">
-  <p:cSld>
-    <p:spTree>
-      <p:nvGrpSpPr>
-        <p:cNvPr id="1" name=""/>
-        <p:cNvGrpSpPr/>
-        <p:nvPr/>
-      </p:nvGrpSpPr>
-      <p:grpSpPr>
-        <a:xfrm>
-          <a:off x="0" y="0"/>
-          <a:ext cx="0" cy="0"/>
-          <a:chOff x="0" y="0"/>
-          <a:chExt cx="0" cy="0"/>
-        </a:xfrm>
-      </p:grpSpPr>
-      <p:sp>
-        <p:nvSpPr>
-          <p:cNvPr id="2" name="Title 1"/>
-          <p:cNvSpPr>
-            <a:spLocks noGrp="1"/>
-          </p:cNvSpPr>
-          <p:nvPr>
-            <p:ph type="title"/>
-          </p:nvPr>
-        </p:nvSpPr>
-        <p:spPr/>
-        <p:txBody>
-          <a:bodyPr/>
-          <a:lstStyle/>
-          <a:p>
-            <a:r>
-              <a:rPr lang="en-US" dirty="0"/>
-              <a:t>Other considerations</a:t>
-            </a:r>
-          </a:p>
-        </p:txBody>
-      </p:sp>
-      <p:sp>
-        <p:nvSpPr>
-          <p:cNvPr id="3" name="Content Placeholder 2"/>
-          <p:cNvSpPr>
-            <a:spLocks noGrp="1"/>
-          </p:cNvSpPr>
-          <p:nvPr>
-            <p:ph idx="1"/>
-          </p:nvPr>
-        </p:nvSpPr>
-        <p:spPr/>
-        <p:txBody>
-          <a:bodyPr/>
-          <a:lstStyle/>
-          <a:p>
-            <a:r>
-              <a:rPr lang="en-US" dirty="0"/>
-              <a:t>Secrets</a:t>
-            </a:r>
-          </a:p>
-          <a:p>
-            <a:pPr lvl="1"/>
-            <a:r>
-              <a:rPr lang="en-US" dirty="0"/>
-              <a:t>Often stored locally, may need to be centralized and more security added.</a:t>
-            </a:r>
-          </a:p>
-        </p:txBody>
-      </p:sp>
-    </p:spTree>
-    <p:extLst>
-      <p:ext uri="{BB962C8B-B14F-4D97-AF65-F5344CB8AC3E}">
-        <p14:creationId xmlns:p14="http://schemas.microsoft.com/office/powerpoint/2010/main" val="1835993967"/>
-      </p:ext>
-    </p:extLst>
-  </p:cSld>
-  <p:clrMapOvr>
-    <a:masterClrMapping/>
-  </p:clrMapOvr>
-</p:sld>
-</file>
-
-<file path=ppt/slides/slide26.xml><?xml version="1.0" encoding="utf-8"?>
-<p:sld xmlns:a="http://schemas.openxmlformats.org/drawingml/2006/main" xmlns:r="http://schemas.openxmlformats.org/officeDocument/2006/relationships" xmlns:p="http://schemas.openxmlformats.org/presentationml/2006/main">
-  <p:cSld>
-    <p:spTree>
-      <p:nvGrpSpPr>
-        <p:cNvPr id="1" name=""/>
-        <p:cNvGrpSpPr/>
-        <p:nvPr/>
-      </p:nvGrpSpPr>
-      <p:grpSpPr>
-        <a:xfrm>
-          <a:off x="0" y="0"/>
-          <a:ext cx="0" cy="0"/>
-          <a:chOff x="0" y="0"/>
-          <a:chExt cx="0" cy="0"/>
-        </a:xfrm>
-      </p:grpSpPr>
-      <p:sp>
-        <p:nvSpPr>
-          <p:cNvPr id="2" name="Title 1">
-            <a:extLst>
-              <a:ext uri="{FF2B5EF4-FFF2-40B4-BE49-F238E27FC236}">
-                <a16:creationId xmlns:a16="http://schemas.microsoft.com/office/drawing/2014/main" id="{A85B5B34-750B-4E04-BE2C-25954D27F80B}"/>
-              </a:ext>
-            </a:extLst>
-          </p:cNvPr>
-          <p:cNvSpPr>
-            <a:spLocks noGrp="1"/>
-          </p:cNvSpPr>
-          <p:nvPr>
-            <p:ph type="title"/>
-          </p:nvPr>
-        </p:nvSpPr>
-        <p:spPr/>
-        <p:txBody>
-          <a:bodyPr/>
-          <a:lstStyle/>
-          <a:p>
-            <a:r>
-              <a:rPr lang="en-US" dirty="0"/>
-              <a:t>Strategies</a:t>
-            </a:r>
-          </a:p>
-        </p:txBody>
-      </p:sp>
-      <p:sp>
-        <p:nvSpPr>
-          <p:cNvPr id="3" name="Text Placeholder 2">
-            <a:extLst>
-              <a:ext uri="{FF2B5EF4-FFF2-40B4-BE49-F238E27FC236}">
-                <a16:creationId xmlns:a16="http://schemas.microsoft.com/office/drawing/2014/main" id="{B2D16C2D-6139-45EE-9188-7613BE0EF505}"/>
-              </a:ext>
-            </a:extLst>
-          </p:cNvPr>
-          <p:cNvSpPr>
-            <a:spLocks noGrp="1"/>
-          </p:cNvSpPr>
-          <p:nvPr>
-            <p:ph type="body" idx="1"/>
-          </p:nvPr>
-        </p:nvSpPr>
-        <p:spPr/>
-        <p:txBody>
-          <a:bodyPr/>
-          <a:lstStyle/>
-          <a:p>
-            <a:endParaRPr lang="en-US"/>
-          </a:p>
-        </p:txBody>
-      </p:sp>
-    </p:spTree>
-    <p:extLst>
-      <p:ext uri="{BB962C8B-B14F-4D97-AF65-F5344CB8AC3E}">
-        <p14:creationId xmlns:p14="http://schemas.microsoft.com/office/powerpoint/2010/main" val="1337041827"/>
-      </p:ext>
-    </p:extLst>
-  </p:cSld>
-  <p:clrMapOvr>
-    <a:masterClrMapping/>
-  </p:clrMapOvr>
-</p:sld>
-</file>
-
 <file path=ppt/slides/slide27.xml><?xml version="1.0" encoding="utf-8"?>
 <p:sld xmlns:a="http://schemas.openxmlformats.org/drawingml/2006/main" xmlns:r="http://schemas.openxmlformats.org/officeDocument/2006/relationships" xmlns:p="http://schemas.openxmlformats.org/presentationml/2006/main">
   <p:cSld>
@@ -8624,13 +8711,7 @@
       </p:grpSpPr>
       <p:sp>
         <p:nvSpPr>
-          <p:cNvPr id="2" name="Title 1">
-            <a:extLst>
-              <a:ext uri="{FF2B5EF4-FFF2-40B4-BE49-F238E27FC236}">
-                <a16:creationId xmlns:a16="http://schemas.microsoft.com/office/drawing/2014/main" id="{5D18C3BD-E70A-4AD2-BA95-F5FF656AD0B9}"/>
-              </a:ext>
-            </a:extLst>
-          </p:cNvPr>
+          <p:cNvPr id="2" name="Title 1"/>
           <p:cNvSpPr>
             <a:spLocks noGrp="1"/>
           </p:cNvSpPr>
@@ -8645,20 +8726,14 @@
           <a:p>
             <a:r>
               <a:rPr lang="en-US" dirty="0"/>
-              <a:t>SOLID</a:t>
-            </a:r>
-          </a:p>
-        </p:txBody>
-      </p:sp>
-      <p:sp>
-        <p:nvSpPr>
-          <p:cNvPr id="3" name="Content Placeholder 2">
-            <a:extLst>
-              <a:ext uri="{FF2B5EF4-FFF2-40B4-BE49-F238E27FC236}">
-                <a16:creationId xmlns:a16="http://schemas.microsoft.com/office/drawing/2014/main" id="{F45D0F63-0AEE-4E9A-AB0F-9374A61F4256}"/>
-              </a:ext>
-            </a:extLst>
-          </p:cNvPr>
+              <a:t>Other considerations</a:t>
+            </a:r>
+          </a:p>
+        </p:txBody>
+      </p:sp>
+      <p:sp>
+        <p:nvSpPr>
+          <p:cNvPr id="3" name="Content Placeholder 2"/>
           <p:cNvSpPr>
             <a:spLocks noGrp="1"/>
           </p:cNvSpPr>
@@ -8671,14 +8746,24 @@
           <a:bodyPr/>
           <a:lstStyle/>
           <a:p>
-            <a:endParaRPr lang="en-US"/>
+            <a:r>
+              <a:rPr lang="en-US" dirty="0"/>
+              <a:t>Secrets</a:t>
+            </a:r>
+          </a:p>
+          <a:p>
+            <a:pPr lvl="1"/>
+            <a:r>
+              <a:rPr lang="en-US" dirty="0"/>
+              <a:t>Often stored locally, may need to be centralized and more security added.</a:t>
+            </a:r>
           </a:p>
         </p:txBody>
       </p:sp>
     </p:spTree>
     <p:extLst>
       <p:ext uri="{BB962C8B-B14F-4D97-AF65-F5344CB8AC3E}">
-        <p14:creationId xmlns:p14="http://schemas.microsoft.com/office/powerpoint/2010/main" val="3007547385"/>
+        <p14:creationId xmlns:p14="http://schemas.microsoft.com/office/powerpoint/2010/main" val="1835993967"/>
       </p:ext>
     </p:extLst>
   </p:cSld>
@@ -8710,7 +8795,7 @@
           <p:cNvPr id="2" name="Title 1">
             <a:extLst>
               <a:ext uri="{FF2B5EF4-FFF2-40B4-BE49-F238E27FC236}">
-                <a16:creationId xmlns:a16="http://schemas.microsoft.com/office/drawing/2014/main" id="{981C89E3-35A0-4C89-8011-A7A3D260639D}"/>
+                <a16:creationId xmlns:a16="http://schemas.microsoft.com/office/drawing/2014/main" id="{A85B5B34-750B-4E04-BE2C-25954D27F80B}"/>
               </a:ext>
             </a:extLst>
           </p:cNvPr>
@@ -8728,17 +8813,17 @@
           <a:p>
             <a:r>
               <a:rPr lang="en-US" dirty="0"/>
-              <a:t>Service-Oriented Architecture (SOA) </a:t>
-            </a:r>
-          </a:p>
-        </p:txBody>
-      </p:sp>
-      <p:sp>
-        <p:nvSpPr>
-          <p:cNvPr id="3" name="Content Placeholder 2">
+              <a:t>Strategies</a:t>
+            </a:r>
+          </a:p>
+        </p:txBody>
+      </p:sp>
+      <p:sp>
+        <p:nvSpPr>
+          <p:cNvPr id="3" name="Text Placeholder 2">
             <a:extLst>
               <a:ext uri="{FF2B5EF4-FFF2-40B4-BE49-F238E27FC236}">
-                <a16:creationId xmlns:a16="http://schemas.microsoft.com/office/drawing/2014/main" id="{E5823A62-C96E-42D1-8CD5-750C2E0EF935}"/>
+                <a16:creationId xmlns:a16="http://schemas.microsoft.com/office/drawing/2014/main" id="{B2D16C2D-6139-45EE-9188-7613BE0EF505}"/>
               </a:ext>
             </a:extLst>
           </p:cNvPr>
@@ -8746,25 +8831,22 @@
             <a:spLocks noGrp="1"/>
           </p:cNvSpPr>
           <p:nvPr>
-            <p:ph idx="1"/>
-          </p:nvPr>
-        </p:nvSpPr>
-        <p:spPr/>
-        <p:txBody>
-          <a:bodyPr/>
-          <a:lstStyle/>
-          <a:p>
-            <a:r>
-              <a:rPr lang="en-US" dirty="0"/>
-              <a:t>Autonomy</a:t>
-            </a:r>
+            <p:ph type="body" idx="1"/>
+          </p:nvPr>
+        </p:nvSpPr>
+        <p:spPr/>
+        <p:txBody>
+          <a:bodyPr/>
+          <a:lstStyle/>
+          <a:p>
+            <a:endParaRPr lang="en-US"/>
           </a:p>
         </p:txBody>
       </p:sp>
     </p:spTree>
     <p:extLst>
       <p:ext uri="{BB962C8B-B14F-4D97-AF65-F5344CB8AC3E}">
-        <p14:creationId xmlns:p14="http://schemas.microsoft.com/office/powerpoint/2010/main" val="4256856249"/>
+        <p14:creationId xmlns:p14="http://schemas.microsoft.com/office/powerpoint/2010/main" val="1337041827"/>
       </p:ext>
     </p:extLst>
   </p:cSld>
@@ -8796,7 +8878,7 @@
           <p:cNvPr id="2" name="Title 1">
             <a:extLst>
               <a:ext uri="{FF2B5EF4-FFF2-40B4-BE49-F238E27FC236}">
-                <a16:creationId xmlns:a16="http://schemas.microsoft.com/office/drawing/2014/main" id="{C5D3E6EA-AB3D-4995-B8C9-4ECB63C0EFC3}"/>
+                <a16:creationId xmlns:a16="http://schemas.microsoft.com/office/drawing/2014/main" id="{5D18C3BD-E70A-4AD2-BA95-F5FF656AD0B9}"/>
               </a:ext>
             </a:extLst>
           </p:cNvPr>
@@ -8814,7 +8896,7 @@
           <a:p>
             <a:r>
               <a:rPr lang="en-US" dirty="0"/>
-              <a:t>Domain Driven Design (DDD)</a:t>
+              <a:t>SOLID</a:t>
             </a:r>
           </a:p>
         </p:txBody>
@@ -8824,7 +8906,7 @@
           <p:cNvPr id="3" name="Content Placeholder 2">
             <a:extLst>
               <a:ext uri="{FF2B5EF4-FFF2-40B4-BE49-F238E27FC236}">
-                <a16:creationId xmlns:a16="http://schemas.microsoft.com/office/drawing/2014/main" id="{1B003EA1-D7E4-4F04-B4C6-CF010AE98057}"/>
+                <a16:creationId xmlns:a16="http://schemas.microsoft.com/office/drawing/2014/main" id="{F45D0F63-0AEE-4E9A-AB0F-9374A61F4256}"/>
               </a:ext>
             </a:extLst>
           </p:cNvPr>
@@ -8840,14 +8922,45 @@
           <a:bodyPr/>
           <a:lstStyle/>
           <a:p>
-            <a:endParaRPr lang="en-US"/>
+            <a:r>
+              <a:rPr lang="en-US" dirty="0"/>
+              <a:t>Single Responsibility</a:t>
+            </a:r>
+          </a:p>
+          <a:p>
+            <a:r>
+              <a:rPr lang="en-US" dirty="0"/>
+              <a:t>Open-Closed</a:t>
+            </a:r>
+          </a:p>
+          <a:p>
+            <a:r>
+              <a:rPr lang="en-US" dirty="0" err="1"/>
+              <a:t>Liskov</a:t>
+            </a:r>
+            <a:r>
+              <a:rPr lang="en-US" dirty="0"/>
+              <a:t> Substitution</a:t>
+            </a:r>
+          </a:p>
+          <a:p>
+            <a:r>
+              <a:rPr lang="en-US" dirty="0"/>
+              <a:t>Interface Segregation</a:t>
+            </a:r>
+          </a:p>
+          <a:p>
+            <a:r>
+              <a:rPr lang="en-US" dirty="0"/>
+              <a:t>Dependency Inversion</a:t>
+            </a:r>
           </a:p>
         </p:txBody>
       </p:sp>
     </p:spTree>
     <p:extLst>
       <p:ext uri="{BB962C8B-B14F-4D97-AF65-F5344CB8AC3E}">
-        <p14:creationId xmlns:p14="http://schemas.microsoft.com/office/powerpoint/2010/main" val="1874970978"/>
+        <p14:creationId xmlns:p14="http://schemas.microsoft.com/office/powerpoint/2010/main" val="3007547385"/>
       </p:ext>
     </p:extLst>
   </p:cSld>
@@ -8944,8 +9057,8 @@
         </p:nvSpPr>
         <p:spPr>
           <a:xfrm>
-            <a:off x="6336287" y="2160589"/>
-            <a:ext cx="2934714" cy="3880773"/>
+            <a:off x="6264492" y="2160589"/>
+            <a:ext cx="3305471" cy="3880773"/>
           </a:xfrm>
         </p:spPr>
         <p:txBody>
@@ -8962,8 +9075,14 @@
           <a:p>
             <a:pPr lvl="1"/>
             <a:r>
-              <a:rPr lang="en-US" dirty="0"/>
-              <a:t>http://</a:t>
+              <a:rPr lang="en-US" dirty="0">
+                <a:hlinkClick r:id="rId3"/>
+              </a:rPr>
+              <a:t>http://bit.ly/TES-slides</a:t>
+            </a:r>
+            <a:r>
+              <a:rPr lang="en-US" dirty="0"/>
+              <a:t> </a:t>
             </a:r>
           </a:p>
           <a:p>
@@ -8995,6 +9114,274 @@
 </file>
 
 <file path=ppt/slides/slide30.xml><?xml version="1.0" encoding="utf-8"?>
+<p:sld xmlns:a="http://schemas.openxmlformats.org/drawingml/2006/main" xmlns:r="http://schemas.openxmlformats.org/officeDocument/2006/relationships" xmlns:p="http://schemas.openxmlformats.org/presentationml/2006/main">
+  <p:cSld>
+    <p:spTree>
+      <p:nvGrpSpPr>
+        <p:cNvPr id="1" name=""/>
+        <p:cNvGrpSpPr/>
+        <p:nvPr/>
+      </p:nvGrpSpPr>
+      <p:grpSpPr>
+        <a:xfrm>
+          <a:off x="0" y="0"/>
+          <a:ext cx="0" cy="0"/>
+          <a:chOff x="0" y="0"/>
+          <a:chExt cx="0" cy="0"/>
+        </a:xfrm>
+      </p:grpSpPr>
+      <p:sp>
+        <p:nvSpPr>
+          <p:cNvPr id="2" name="Title 1">
+            <a:extLst>
+              <a:ext uri="{FF2B5EF4-FFF2-40B4-BE49-F238E27FC236}">
+                <a16:creationId xmlns:a16="http://schemas.microsoft.com/office/drawing/2014/main" id="{981C89E3-35A0-4C89-8011-A7A3D260639D}"/>
+              </a:ext>
+            </a:extLst>
+          </p:cNvPr>
+          <p:cNvSpPr>
+            <a:spLocks noGrp="1"/>
+          </p:cNvSpPr>
+          <p:nvPr>
+            <p:ph type="title"/>
+          </p:nvPr>
+        </p:nvSpPr>
+        <p:spPr/>
+        <p:txBody>
+          <a:bodyPr/>
+          <a:lstStyle/>
+          <a:p>
+            <a:r>
+              <a:rPr lang="en-US" dirty="0"/>
+              <a:t>Service-Oriented Architecture (SOA) </a:t>
+            </a:r>
+          </a:p>
+        </p:txBody>
+      </p:sp>
+      <p:sp>
+        <p:nvSpPr>
+          <p:cNvPr id="3" name="Content Placeholder 2">
+            <a:extLst>
+              <a:ext uri="{FF2B5EF4-FFF2-40B4-BE49-F238E27FC236}">
+                <a16:creationId xmlns:a16="http://schemas.microsoft.com/office/drawing/2014/main" id="{E5823A62-C96E-42D1-8CD5-750C2E0EF935}"/>
+              </a:ext>
+            </a:extLst>
+          </p:cNvPr>
+          <p:cNvSpPr>
+            <a:spLocks noGrp="1"/>
+          </p:cNvSpPr>
+          <p:nvPr>
+            <p:ph idx="1"/>
+          </p:nvPr>
+        </p:nvSpPr>
+        <p:spPr/>
+        <p:txBody>
+          <a:bodyPr/>
+          <a:lstStyle/>
+          <a:p>
+            <a:r>
+              <a:rPr lang="en-US" dirty="0"/>
+              <a:t>Service “contract”</a:t>
+            </a:r>
+          </a:p>
+          <a:p>
+            <a:r>
+              <a:rPr lang="en-US" dirty="0"/>
+              <a:t>Autonomy</a:t>
+            </a:r>
+          </a:p>
+          <a:p>
+            <a:r>
+              <a:rPr lang="en-US" dirty="0"/>
+              <a:t>Composable</a:t>
+            </a:r>
+          </a:p>
+          <a:p>
+            <a:r>
+              <a:rPr lang="en-US" dirty="0"/>
+              <a:t>Abstraction, encapsulation, reusability.</a:t>
+            </a:r>
+          </a:p>
+          <a:p>
+            <a:r>
+              <a:rPr lang="en-US" dirty="0"/>
+              <a:t>Discoverability</a:t>
+            </a:r>
+          </a:p>
+          <a:p>
+            <a:r>
+              <a:rPr lang="en-US" dirty="0"/>
+              <a:t>Statelessness</a:t>
+            </a:r>
+          </a:p>
+          <a:p>
+            <a:r>
+              <a:rPr lang="en-US" dirty="0"/>
+              <a:t>Microservices</a:t>
+            </a:r>
+          </a:p>
+        </p:txBody>
+      </p:sp>
+    </p:spTree>
+    <p:extLst>
+      <p:ext uri="{BB962C8B-B14F-4D97-AF65-F5344CB8AC3E}">
+        <p14:creationId xmlns:p14="http://schemas.microsoft.com/office/powerpoint/2010/main" val="4256856249"/>
+      </p:ext>
+    </p:extLst>
+  </p:cSld>
+  <p:clrMapOvr>
+    <a:masterClrMapping/>
+  </p:clrMapOvr>
+</p:sld>
+</file>
+
+<file path=ppt/slides/slide31.xml><?xml version="1.0" encoding="utf-8"?>
+<p:sld xmlns:a="http://schemas.openxmlformats.org/drawingml/2006/main" xmlns:r="http://schemas.openxmlformats.org/officeDocument/2006/relationships" xmlns:p="http://schemas.openxmlformats.org/presentationml/2006/main">
+  <p:cSld>
+    <p:spTree>
+      <p:nvGrpSpPr>
+        <p:cNvPr id="1" name=""/>
+        <p:cNvGrpSpPr/>
+        <p:nvPr/>
+      </p:nvGrpSpPr>
+      <p:grpSpPr>
+        <a:xfrm>
+          <a:off x="0" y="0"/>
+          <a:ext cx="0" cy="0"/>
+          <a:chOff x="0" y="0"/>
+          <a:chExt cx="0" cy="0"/>
+        </a:xfrm>
+      </p:grpSpPr>
+      <p:sp>
+        <p:nvSpPr>
+          <p:cNvPr id="2" name="Title 1">
+            <a:extLst>
+              <a:ext uri="{FF2B5EF4-FFF2-40B4-BE49-F238E27FC236}">
+                <a16:creationId xmlns:a16="http://schemas.microsoft.com/office/drawing/2014/main" id="{C5D3E6EA-AB3D-4995-B8C9-4ECB63C0EFC3}"/>
+              </a:ext>
+            </a:extLst>
+          </p:cNvPr>
+          <p:cNvSpPr>
+            <a:spLocks noGrp="1"/>
+          </p:cNvSpPr>
+          <p:nvPr>
+            <p:ph type="title"/>
+          </p:nvPr>
+        </p:nvSpPr>
+        <p:spPr/>
+        <p:txBody>
+          <a:bodyPr/>
+          <a:lstStyle/>
+          <a:p>
+            <a:r>
+              <a:rPr lang="en-US" dirty="0"/>
+              <a:t>Domain Driven Design (DDD)</a:t>
+            </a:r>
+          </a:p>
+        </p:txBody>
+      </p:sp>
+      <p:sp>
+        <p:nvSpPr>
+          <p:cNvPr id="3" name="Content Placeholder 2">
+            <a:extLst>
+              <a:ext uri="{FF2B5EF4-FFF2-40B4-BE49-F238E27FC236}">
+                <a16:creationId xmlns:a16="http://schemas.microsoft.com/office/drawing/2014/main" id="{1B003EA1-D7E4-4F04-B4C6-CF010AE98057}"/>
+              </a:ext>
+            </a:extLst>
+          </p:cNvPr>
+          <p:cNvSpPr>
+            <a:spLocks noGrp="1"/>
+          </p:cNvSpPr>
+          <p:nvPr>
+            <p:ph idx="1"/>
+          </p:nvPr>
+        </p:nvSpPr>
+        <p:spPr/>
+        <p:txBody>
+          <a:bodyPr/>
+          <a:lstStyle/>
+          <a:p>
+            <a:r>
+              <a:rPr lang="en-US" dirty="0"/>
+              <a:t>Ubiquitous language</a:t>
+            </a:r>
+          </a:p>
+          <a:p>
+            <a:r>
+              <a:rPr lang="en-US" dirty="0"/>
+              <a:t>Bounded contexts</a:t>
+            </a:r>
+          </a:p>
+          <a:p>
+            <a:r>
+              <a:rPr lang="en-US" dirty="0"/>
+              <a:t>Continuous Integration</a:t>
+            </a:r>
+          </a:p>
+          <a:p>
+            <a:r>
+              <a:rPr lang="en-US" dirty="0"/>
+              <a:t>Model-Driven</a:t>
+            </a:r>
+          </a:p>
+          <a:p>
+            <a:r>
+              <a:rPr lang="en-US" dirty="0"/>
+              <a:t>Patterns</a:t>
+            </a:r>
+          </a:p>
+          <a:p>
+            <a:pPr lvl="1"/>
+            <a:r>
+              <a:rPr lang="en-US" dirty="0"/>
+              <a:t>Entity &amp; Value Objects</a:t>
+            </a:r>
+          </a:p>
+          <a:p>
+            <a:pPr lvl="1"/>
+            <a:r>
+              <a:rPr lang="en-US" dirty="0"/>
+              <a:t>Aggregates (consistency/atomicity boundary)</a:t>
+            </a:r>
+          </a:p>
+          <a:p>
+            <a:pPr lvl="1"/>
+            <a:r>
+              <a:rPr lang="en-US" dirty="0"/>
+              <a:t>Events</a:t>
+            </a:r>
+          </a:p>
+          <a:p>
+            <a:pPr lvl="1"/>
+            <a:r>
+              <a:rPr lang="en-US" dirty="0"/>
+              <a:t>Repository</a:t>
+            </a:r>
+          </a:p>
+          <a:p>
+            <a:pPr lvl="1"/>
+            <a:endParaRPr lang="en-US" dirty="0"/>
+          </a:p>
+          <a:p>
+            <a:pPr lvl="1"/>
+            <a:endParaRPr lang="en-US" dirty="0"/>
+          </a:p>
+        </p:txBody>
+      </p:sp>
+    </p:spTree>
+    <p:extLst>
+      <p:ext uri="{BB962C8B-B14F-4D97-AF65-F5344CB8AC3E}">
+        <p14:creationId xmlns:p14="http://schemas.microsoft.com/office/powerpoint/2010/main" val="1874970978"/>
+      </p:ext>
+    </p:extLst>
+  </p:cSld>
+  <p:clrMapOvr>
+    <a:masterClrMapping/>
+  </p:clrMapOvr>
+</p:sld>
+</file>
+
+<file path=ppt/slides/slide32.xml><?xml version="1.0" encoding="utf-8"?>
 <p:sld xmlns:a="http://schemas.openxmlformats.org/drawingml/2006/main" xmlns:r="http://schemas.openxmlformats.org/officeDocument/2006/relationships" xmlns:p="http://schemas.openxmlformats.org/presentationml/2006/main">
   <p:cSld>
     <p:spTree>
@@ -9089,7 +9476,7 @@
 </p:sld>
 </file>
 
-<file path=ppt/slides/slide31.xml><?xml version="1.0" encoding="utf-8"?>
+<file path=ppt/slides/slide33.xml><?xml version="1.0" encoding="utf-8"?>
 <p:sld xmlns:a="http://schemas.openxmlformats.org/drawingml/2006/main" xmlns:r="http://schemas.openxmlformats.org/officeDocument/2006/relationships" xmlns:p="http://schemas.openxmlformats.org/presentationml/2006/main">
   <p:cSld>
     <p:spTree>
@@ -9156,7 +9543,7 @@
           <p:nvPr/>
         </p:nvPicPr>
         <p:blipFill>
-          <a:blip r:embed="rId2"/>
+          <a:blip r:embed="rId3"/>
           <a:stretch>
             <a:fillRect/>
           </a:stretch>
@@ -9184,7 +9571,7 @@
 </p:sld>
 </file>
 
-<file path=ppt/slides/slide32.xml><?xml version="1.0" encoding="utf-8"?>
+<file path=ppt/slides/slide34.xml><?xml version="1.0" encoding="utf-8"?>
 <p:sld xmlns:a="http://schemas.openxmlformats.org/drawingml/2006/main" xmlns:r="http://schemas.openxmlformats.org/officeDocument/2006/relationships" xmlns:p="http://schemas.openxmlformats.org/presentationml/2006/main">
   <p:cSld>
     <p:spTree>
@@ -9279,241 +9666,6 @@
 </p:sld>
 </file>
 
-<file path=ppt/slides/slide33.xml><?xml version="1.0" encoding="utf-8"?>
-<p:sld xmlns:a="http://schemas.openxmlformats.org/drawingml/2006/main" xmlns:r="http://schemas.openxmlformats.org/officeDocument/2006/relationships" xmlns:p="http://schemas.openxmlformats.org/presentationml/2006/main">
-  <p:cSld>
-    <p:spTree>
-      <p:nvGrpSpPr>
-        <p:cNvPr id="1" name=""/>
-        <p:cNvGrpSpPr/>
-        <p:nvPr/>
-      </p:nvGrpSpPr>
-      <p:grpSpPr>
-        <a:xfrm>
-          <a:off x="0" y="0"/>
-          <a:ext cx="0" cy="0"/>
-          <a:chOff x="0" y="0"/>
-          <a:chExt cx="0" cy="0"/>
-        </a:xfrm>
-      </p:grpSpPr>
-      <p:sp>
-        <p:nvSpPr>
-          <p:cNvPr id="2" name="Title 1"/>
-          <p:cNvSpPr>
-            <a:spLocks noGrp="1"/>
-          </p:cNvSpPr>
-          <p:nvPr>
-            <p:ph type="title"/>
-          </p:nvPr>
-        </p:nvSpPr>
-        <p:spPr/>
-        <p:txBody>
-          <a:bodyPr/>
-          <a:lstStyle/>
-          <a:p>
-            <a:r>
-              <a:rPr lang="en-US" dirty="0"/>
-              <a:t>Hexagonal Architecture</a:t>
-            </a:r>
-          </a:p>
-        </p:txBody>
-      </p:sp>
-      <p:sp>
-        <p:nvSpPr>
-          <p:cNvPr id="3" name="Content Placeholder 2"/>
-          <p:cNvSpPr>
-            <a:spLocks noGrp="1"/>
-          </p:cNvSpPr>
-          <p:nvPr>
-            <p:ph idx="1"/>
-          </p:nvPr>
-        </p:nvSpPr>
-        <p:spPr/>
-        <p:txBody>
-          <a:bodyPr/>
-          <a:lstStyle/>
-          <a:p>
-            <a:r>
-              <a:rPr lang="en-US" dirty="0"/>
-              <a:t>“Ports and Adapters”</a:t>
-            </a:r>
-          </a:p>
-          <a:p>
-            <a:r>
-              <a:rPr lang="en-US" dirty="0"/>
-              <a:t>Adapters == Mediators</a:t>
-            </a:r>
-          </a:p>
-          <a:p>
-            <a:r>
-              <a:rPr lang="en-US" dirty="0"/>
-              <a:t>Ports == Group of interfaces</a:t>
-            </a:r>
-          </a:p>
-          <a:p>
-            <a:r>
-              <a:rPr lang="en-US" dirty="0"/>
-              <a:t>1 to 6 edges for “port”</a:t>
-            </a:r>
-          </a:p>
-          <a:p>
-            <a:r>
-              <a:rPr lang="en-US" dirty="0"/>
-              <a:t>Ports:</a:t>
-            </a:r>
-          </a:p>
-          <a:p>
-            <a:pPr lvl="1"/>
-            <a:r>
-              <a:rPr lang="en-US" dirty="0"/>
-              <a:t>Interface with the user</a:t>
-            </a:r>
-          </a:p>
-          <a:p>
-            <a:pPr lvl="1"/>
-            <a:r>
-              <a:rPr lang="en-US" dirty="0"/>
-              <a:t>Database</a:t>
-            </a:r>
-          </a:p>
-          <a:p>
-            <a:pPr lvl="1"/>
-            <a:r>
-              <a:rPr lang="en-US" dirty="0"/>
-              <a:t>Maybe administration interface</a:t>
-            </a:r>
-          </a:p>
-          <a:p>
-            <a:pPr lvl="1"/>
-            <a:r>
-              <a:rPr lang="en-US" dirty="0"/>
-              <a:t>Maybe 3</a:t>
-            </a:r>
-            <a:r>
-              <a:rPr lang="en-US" baseline="30000" dirty="0"/>
-              <a:t>rd</a:t>
-            </a:r>
-            <a:r>
-              <a:rPr lang="en-US" dirty="0"/>
-              <a:t> party services.</a:t>
-            </a:r>
-          </a:p>
-          <a:p>
-            <a:pPr lvl="1"/>
-            <a:r>
-              <a:rPr lang="en-US" dirty="0"/>
-              <a:t>Etc.</a:t>
-            </a:r>
-          </a:p>
-        </p:txBody>
-      </p:sp>
-    </p:spTree>
-    <p:extLst>
-      <p:ext uri="{BB962C8B-B14F-4D97-AF65-F5344CB8AC3E}">
-        <p14:creationId xmlns:p14="http://schemas.microsoft.com/office/powerpoint/2010/main" val="1834538684"/>
-      </p:ext>
-    </p:extLst>
-  </p:cSld>
-  <p:clrMapOvr>
-    <a:masterClrMapping/>
-  </p:clrMapOvr>
-</p:sld>
-</file>
-
-<file path=ppt/slides/slide34.xml><?xml version="1.0" encoding="utf-8"?>
-<p:sld xmlns:a="http://schemas.openxmlformats.org/drawingml/2006/main" xmlns:r="http://schemas.openxmlformats.org/officeDocument/2006/relationships" xmlns:p="http://schemas.openxmlformats.org/presentationml/2006/main">
-  <p:cSld>
-    <p:spTree>
-      <p:nvGrpSpPr>
-        <p:cNvPr id="1" name=""/>
-        <p:cNvGrpSpPr/>
-        <p:nvPr/>
-      </p:nvGrpSpPr>
-      <p:grpSpPr>
-        <a:xfrm>
-          <a:off x="0" y="0"/>
-          <a:ext cx="0" cy="0"/>
-          <a:chOff x="0" y="0"/>
-          <a:chExt cx="0" cy="0"/>
-        </a:xfrm>
-      </p:grpSpPr>
-      <p:sp>
-        <p:nvSpPr>
-          <p:cNvPr id="2" name="Title 1"/>
-          <p:cNvSpPr>
-            <a:spLocks noGrp="1"/>
-          </p:cNvSpPr>
-          <p:nvPr>
-            <p:ph type="title"/>
-          </p:nvPr>
-        </p:nvSpPr>
-        <p:spPr/>
-        <p:txBody>
-          <a:bodyPr/>
-          <a:lstStyle/>
-          <a:p>
-            <a:r>
-              <a:rPr lang="en-US" dirty="0"/>
-              <a:t>Hexagonal Architecture</a:t>
-            </a:r>
-          </a:p>
-        </p:txBody>
-      </p:sp>
-      <p:sp>
-        <p:nvSpPr>
-          <p:cNvPr id="3" name="Content Placeholder 2"/>
-          <p:cNvSpPr>
-            <a:spLocks noGrp="1"/>
-          </p:cNvSpPr>
-          <p:nvPr>
-            <p:ph idx="1"/>
-          </p:nvPr>
-        </p:nvSpPr>
-        <p:spPr/>
-        <p:txBody>
-          <a:bodyPr/>
-          <a:lstStyle/>
-          <a:p>
-            <a:r>
-              <a:rPr lang="en-US" dirty="0"/>
-              <a:t>Left side: application internals</a:t>
-            </a:r>
-          </a:p>
-          <a:p>
-            <a:pPr lvl="1"/>
-            <a:r>
-              <a:rPr lang="en-US" dirty="0"/>
-              <a:t>Directly tested by unit, integration, automated tests</a:t>
-            </a:r>
-          </a:p>
-          <a:p>
-            <a:r>
-              <a:rPr lang="en-US" dirty="0"/>
-              <a:t>Right side: external connections</a:t>
-            </a:r>
-          </a:p>
-          <a:p>
-            <a:pPr lvl="1"/>
-            <a:r>
-              <a:rPr lang="en-US" dirty="0"/>
-              <a:t>Mocks/Doubles used in various stages of testing</a:t>
-            </a:r>
-          </a:p>
-        </p:txBody>
-      </p:sp>
-    </p:spTree>
-    <p:extLst>
-      <p:ext uri="{BB962C8B-B14F-4D97-AF65-F5344CB8AC3E}">
-        <p14:creationId xmlns:p14="http://schemas.microsoft.com/office/powerpoint/2010/main" val="566068408"/>
-      </p:ext>
-    </p:extLst>
-  </p:cSld>
-  <p:clrMapOvr>
-    <a:masterClrMapping/>
-  </p:clrMapOvr>
-</p:sld>
-</file>
-
 <file path=ppt/slides/slide35.xml><?xml version="1.0" encoding="utf-8"?>
 <p:sld xmlns:a="http://schemas.openxmlformats.org/drawingml/2006/main" xmlns:r="http://schemas.openxmlformats.org/officeDocument/2006/relationships" xmlns:p="http://schemas.openxmlformats.org/presentationml/2006/main">
   <p:cSld>
@@ -9533,13 +9685,7 @@
       </p:grpSpPr>
       <p:sp>
         <p:nvSpPr>
-          <p:cNvPr id="2" name="Title 1">
-            <a:extLst>
-              <a:ext uri="{FF2B5EF4-FFF2-40B4-BE49-F238E27FC236}">
-                <a16:creationId xmlns:a16="http://schemas.microsoft.com/office/drawing/2014/main" id="{92BD5C19-89D1-4D94-BB2A-C3532B048063}"/>
-              </a:ext>
-            </a:extLst>
-          </p:cNvPr>
+          <p:cNvPr id="2" name="Title 1"/>
           <p:cNvSpPr>
             <a:spLocks noGrp="1"/>
           </p:cNvSpPr>
@@ -9554,20 +9700,14 @@
           <a:p>
             <a:r>
               <a:rPr lang="en-US" dirty="0"/>
-              <a:t>SAGAS</a:t>
-            </a:r>
-          </a:p>
-        </p:txBody>
-      </p:sp>
-      <p:sp>
-        <p:nvSpPr>
-          <p:cNvPr id="3" name="Content Placeholder 2">
-            <a:extLst>
-              <a:ext uri="{FF2B5EF4-FFF2-40B4-BE49-F238E27FC236}">
-                <a16:creationId xmlns:a16="http://schemas.microsoft.com/office/drawing/2014/main" id="{BED08F12-B28E-4CB0-A6DD-ABD9C215D16C}"/>
-              </a:ext>
-            </a:extLst>
-          </p:cNvPr>
+              <a:t>Hexagonal Architecture</a:t>
+            </a:r>
+          </a:p>
+        </p:txBody>
+      </p:sp>
+      <p:sp>
+        <p:nvSpPr>
+          <p:cNvPr id="3" name="Content Placeholder 2"/>
           <p:cNvSpPr>
             <a:spLocks noGrp="1"/>
           </p:cNvSpPr>
@@ -9582,49 +9722,74 @@
           <a:p>
             <a:r>
               <a:rPr lang="en-US" dirty="0"/>
-              <a:t>Long-running “Transaction”</a:t>
-            </a:r>
-          </a:p>
-          <a:p>
-            <a:r>
-              <a:rPr lang="en-US" dirty="0"/>
-              <a:t>Not “atomic”</a:t>
-            </a:r>
-          </a:p>
-          <a:p>
-            <a:r>
-              <a:rPr lang="en-US" dirty="0"/>
-              <a:t>Compensatory</a:t>
+              <a:t>“Ports and Adapters”</a:t>
+            </a:r>
+          </a:p>
+          <a:p>
+            <a:r>
+              <a:rPr lang="en-US" dirty="0"/>
+              <a:t>Adapters == Mediators</a:t>
+            </a:r>
+          </a:p>
+          <a:p>
+            <a:r>
+              <a:rPr lang="en-US" dirty="0"/>
+              <a:t>Ports == Group of interfaces</a:t>
+            </a:r>
+          </a:p>
+          <a:p>
+            <a:r>
+              <a:rPr lang="en-US" dirty="0"/>
+              <a:t>1 to 6 edges for “port”</a:t>
+            </a:r>
+          </a:p>
+          <a:p>
+            <a:r>
+              <a:rPr lang="en-US" dirty="0"/>
+              <a:t>Ports:</a:t>
             </a:r>
           </a:p>
           <a:p>
             <a:pPr lvl="1"/>
             <a:r>
               <a:rPr lang="en-US" dirty="0"/>
-              <a:t>Reverses or undoes actions</a:t>
-            </a:r>
-          </a:p>
-          <a:p>
-            <a:endParaRPr lang="en-US" dirty="0"/>
-          </a:p>
-          <a:p>
-            <a:r>
-              <a:rPr lang="en-US" dirty="0"/>
-              <a:t>Important when work is broken down into smaller chunks</a:t>
+              <a:t>Interface with the user</a:t>
             </a:r>
           </a:p>
           <a:p>
             <a:pPr lvl="1"/>
             <a:r>
               <a:rPr lang="en-US" dirty="0"/>
-              <a:t>Across processes</a:t>
+              <a:t>Database</a:t>
             </a:r>
           </a:p>
           <a:p>
             <a:pPr lvl="1"/>
             <a:r>
               <a:rPr lang="en-US" dirty="0"/>
-              <a:t>Across services</a:t>
+              <a:t>Maybe administration interface</a:t>
+            </a:r>
+          </a:p>
+          <a:p>
+            <a:pPr lvl="1"/>
+            <a:r>
+              <a:rPr lang="en-US" dirty="0"/>
+              <a:t>Maybe 3</a:t>
+            </a:r>
+            <a:r>
+              <a:rPr lang="en-US" baseline="30000" dirty="0"/>
+              <a:t>rd</a:t>
+            </a:r>
+            <a:r>
+              <a:rPr lang="en-US" dirty="0"/>
+              <a:t> party services.</a:t>
+            </a:r>
+          </a:p>
+          <a:p>
+            <a:pPr lvl="1"/>
+            <a:r>
+              <a:rPr lang="en-US" dirty="0"/>
+              <a:t>Etc.</a:t>
             </a:r>
           </a:p>
         </p:txBody>
@@ -9632,7 +9797,7 @@
     </p:spTree>
     <p:extLst>
       <p:ext uri="{BB962C8B-B14F-4D97-AF65-F5344CB8AC3E}">
-        <p14:creationId xmlns:p14="http://schemas.microsoft.com/office/powerpoint/2010/main" val="2564122038"/>
+        <p14:creationId xmlns:p14="http://schemas.microsoft.com/office/powerpoint/2010/main" val="1834538684"/>
       </p:ext>
     </p:extLst>
   </p:cSld>
@@ -9661,13 +9826,7 @@
       </p:grpSpPr>
       <p:sp>
         <p:nvSpPr>
-          <p:cNvPr id="2" name="Title 1">
-            <a:extLst>
-              <a:ext uri="{FF2B5EF4-FFF2-40B4-BE49-F238E27FC236}">
-                <a16:creationId xmlns:a16="http://schemas.microsoft.com/office/drawing/2014/main" id="{92BD5C19-89D1-4D94-BB2A-C3532B048063}"/>
-              </a:ext>
-            </a:extLst>
-          </p:cNvPr>
+          <p:cNvPr id="2" name="Title 1"/>
           <p:cNvSpPr>
             <a:spLocks noGrp="1"/>
           </p:cNvSpPr>
@@ -9682,20 +9841,14 @@
           <a:p>
             <a:r>
               <a:rPr lang="en-US" dirty="0"/>
-              <a:t>“Services”</a:t>
-            </a:r>
-          </a:p>
-        </p:txBody>
-      </p:sp>
-      <p:sp>
-        <p:nvSpPr>
-          <p:cNvPr id="3" name="Content Placeholder 2">
-            <a:extLst>
-              <a:ext uri="{FF2B5EF4-FFF2-40B4-BE49-F238E27FC236}">
-                <a16:creationId xmlns:a16="http://schemas.microsoft.com/office/drawing/2014/main" id="{BED08F12-B28E-4CB0-A6DD-ABD9C215D16C}"/>
-              </a:ext>
-            </a:extLst>
-          </p:cNvPr>
+              <a:t>Hexagonal Architecture</a:t>
+            </a:r>
+          </a:p>
+        </p:txBody>
+      </p:sp>
+      <p:sp>
+        <p:nvSpPr>
+          <p:cNvPr id="3" name="Content Placeholder 2"/>
           <p:cNvSpPr>
             <a:spLocks noGrp="1"/>
           </p:cNvSpPr>
@@ -9710,25 +9863,27 @@
           <a:p>
             <a:r>
               <a:rPr lang="en-US" dirty="0"/>
-              <a:t>RESTful</a:t>
-            </a:r>
-          </a:p>
-          <a:p>
-            <a:r>
-              <a:rPr lang="en-US" dirty="0"/>
-              <a:t>Message-oriented</a:t>
-            </a:r>
-          </a:p>
-          <a:p>
-            <a:r>
-              <a:rPr lang="en-US" dirty="0"/>
-              <a:t>Hybrid</a:t>
-            </a:r>
-          </a:p>
-          <a:p>
-            <a:r>
-              <a:rPr lang="en-US" dirty="0"/>
-              <a:t>Etc.</a:t>
+              <a:t>Left side: application internals</a:t>
+            </a:r>
+          </a:p>
+          <a:p>
+            <a:pPr lvl="1"/>
+            <a:r>
+              <a:rPr lang="en-US" dirty="0"/>
+              <a:t>Directly tested by unit, integration, automated tests</a:t>
+            </a:r>
+          </a:p>
+          <a:p>
+            <a:r>
+              <a:rPr lang="en-US" dirty="0"/>
+              <a:t>Right side: external connections</a:t>
+            </a:r>
+          </a:p>
+          <a:p>
+            <a:pPr lvl="1"/>
+            <a:r>
+              <a:rPr lang="en-US" dirty="0"/>
+              <a:t>Mocks/Doubles used in various stages of testing</a:t>
             </a:r>
           </a:p>
         </p:txBody>
@@ -9736,7 +9891,7 @@
     </p:spTree>
     <p:extLst>
       <p:ext uri="{BB962C8B-B14F-4D97-AF65-F5344CB8AC3E}">
-        <p14:creationId xmlns:p14="http://schemas.microsoft.com/office/powerpoint/2010/main" val="2018137143"/>
+        <p14:creationId xmlns:p14="http://schemas.microsoft.com/office/powerpoint/2010/main" val="566068408"/>
       </p:ext>
     </p:extLst>
   </p:cSld>
@@ -9768,7 +9923,7 @@
           <p:cNvPr id="2" name="Title 1">
             <a:extLst>
               <a:ext uri="{FF2B5EF4-FFF2-40B4-BE49-F238E27FC236}">
-                <a16:creationId xmlns:a16="http://schemas.microsoft.com/office/drawing/2014/main" id="{992162D5-8B45-4FAE-A7F3-8CF63B9DB96A}"/>
+                <a16:creationId xmlns:a16="http://schemas.microsoft.com/office/drawing/2014/main" id="{69C6D8ED-7A24-41BA-9941-96B8AC832792}"/>
               </a:ext>
             </a:extLst>
           </p:cNvPr>
@@ -9786,17 +9941,17 @@
           <a:p>
             <a:r>
               <a:rPr lang="en-US" dirty="0"/>
-              <a:t>Questions?</a:t>
-            </a:r>
-          </a:p>
-        </p:txBody>
-      </p:sp>
-      <p:sp>
-        <p:nvSpPr>
-          <p:cNvPr id="3" name="Text Placeholder 2">
+              <a:t>Actor Model</a:t>
+            </a:r>
+          </a:p>
+        </p:txBody>
+      </p:sp>
+      <p:sp>
+        <p:nvSpPr>
+          <p:cNvPr id="3" name="Content Placeholder 2">
             <a:extLst>
               <a:ext uri="{FF2B5EF4-FFF2-40B4-BE49-F238E27FC236}">
-                <a16:creationId xmlns:a16="http://schemas.microsoft.com/office/drawing/2014/main" id="{EA337977-2578-4176-BC70-3BF778A54D51}"/>
+                <a16:creationId xmlns:a16="http://schemas.microsoft.com/office/drawing/2014/main" id="{173BA51F-B77B-4ECD-AA3B-A9A2326EC232}"/>
               </a:ext>
             </a:extLst>
           </p:cNvPr>
@@ -9804,22 +9959,70 @@
             <a:spLocks noGrp="1"/>
           </p:cNvSpPr>
           <p:nvPr>
-            <p:ph type="body" idx="1"/>
-          </p:nvPr>
-        </p:nvSpPr>
-        <p:spPr/>
-        <p:txBody>
-          <a:bodyPr/>
-          <a:lstStyle/>
-          <a:p>
-            <a:endParaRPr lang="en-US"/>
+            <p:ph idx="1"/>
+          </p:nvPr>
+        </p:nvSpPr>
+        <p:spPr/>
+        <p:txBody>
+          <a:bodyPr/>
+          <a:lstStyle/>
+          <a:p>
+            <a:r>
+              <a:rPr lang="en-US" dirty="0"/>
+              <a:t>About work breakdown</a:t>
+            </a:r>
+          </a:p>
+          <a:p>
+            <a:r>
+              <a:rPr lang="en-US" dirty="0"/>
+              <a:t>Each actor perform task</a:t>
+            </a:r>
+          </a:p>
+          <a:p>
+            <a:r>
+              <a:rPr lang="en-US" dirty="0"/>
+              <a:t>One actor per task</a:t>
+            </a:r>
+          </a:p>
+          <a:p>
+            <a:r>
+              <a:rPr lang="en-US" dirty="0"/>
+              <a:t>Actor receives message</a:t>
+            </a:r>
+          </a:p>
+          <a:p>
+            <a:r>
+              <a:rPr lang="en-US" dirty="0"/>
+              <a:t>Decoupled from communications methods</a:t>
+            </a:r>
+          </a:p>
+          <a:p>
+            <a:r>
+              <a:rPr lang="en-US" dirty="0"/>
+              <a:t>Can send 1 or more message</a:t>
+            </a:r>
+          </a:p>
+          <a:p>
+            <a:r>
+              <a:rPr lang="en-US" dirty="0"/>
+              <a:t>Can create new actors</a:t>
+            </a:r>
+          </a:p>
+          <a:p>
+            <a:r>
+              <a:rPr lang="en-US" dirty="0"/>
+              <a:t>Can respond to same messages differently</a:t>
+            </a:r>
+          </a:p>
+          <a:p>
+            <a:endParaRPr lang="en-US" dirty="0"/>
           </a:p>
         </p:txBody>
       </p:sp>
     </p:spTree>
     <p:extLst>
       <p:ext uri="{BB962C8B-B14F-4D97-AF65-F5344CB8AC3E}">
-        <p14:creationId xmlns:p14="http://schemas.microsoft.com/office/powerpoint/2010/main" val="2281615065"/>
+        <p14:creationId xmlns:p14="http://schemas.microsoft.com/office/powerpoint/2010/main" val="3330956005"/>
       </p:ext>
     </p:extLst>
   </p:cSld>
@@ -9851,7 +10054,7 @@
           <p:cNvPr id="2" name="Title 1">
             <a:extLst>
               <a:ext uri="{FF2B5EF4-FFF2-40B4-BE49-F238E27FC236}">
-                <a16:creationId xmlns:a16="http://schemas.microsoft.com/office/drawing/2014/main" id="{992162D5-8B45-4FAE-A7F3-8CF63B9DB96A}"/>
+                <a16:creationId xmlns:a16="http://schemas.microsoft.com/office/drawing/2014/main" id="{92BD5C19-89D1-4D94-BB2A-C3532B048063}"/>
               </a:ext>
             </a:extLst>
           </p:cNvPr>
@@ -9869,17 +10072,17 @@
           <a:p>
             <a:r>
               <a:rPr lang="en-US" dirty="0"/>
-              <a:t>Thank You!</a:t>
-            </a:r>
-          </a:p>
-        </p:txBody>
-      </p:sp>
-      <p:sp>
-        <p:nvSpPr>
-          <p:cNvPr id="3" name="Text Placeholder 2">
+              <a:t>SAGAS</a:t>
+            </a:r>
+          </a:p>
+        </p:txBody>
+      </p:sp>
+      <p:sp>
+        <p:nvSpPr>
+          <p:cNvPr id="3" name="Content Placeholder 2">
             <a:extLst>
               <a:ext uri="{FF2B5EF4-FFF2-40B4-BE49-F238E27FC236}">
-                <a16:creationId xmlns:a16="http://schemas.microsoft.com/office/drawing/2014/main" id="{EA337977-2578-4176-BC70-3BF778A54D51}"/>
+                <a16:creationId xmlns:a16="http://schemas.microsoft.com/office/drawing/2014/main" id="{BED08F12-B28E-4CB0-A6DD-ABD9C215D16C}"/>
               </a:ext>
             </a:extLst>
           </p:cNvPr>
@@ -9887,22 +10090,67 @@
             <a:spLocks noGrp="1"/>
           </p:cNvSpPr>
           <p:nvPr>
-            <p:ph type="body" idx="1"/>
-          </p:nvPr>
-        </p:nvSpPr>
-        <p:spPr/>
-        <p:txBody>
-          <a:bodyPr/>
-          <a:lstStyle/>
-          <a:p>
-            <a:endParaRPr lang="en-US"/>
+            <p:ph idx="1"/>
+          </p:nvPr>
+        </p:nvSpPr>
+        <p:spPr/>
+        <p:txBody>
+          <a:bodyPr/>
+          <a:lstStyle/>
+          <a:p>
+            <a:r>
+              <a:rPr lang="en-US" dirty="0"/>
+              <a:t>Long-running “Transaction”</a:t>
+            </a:r>
+          </a:p>
+          <a:p>
+            <a:r>
+              <a:rPr lang="en-US" dirty="0"/>
+              <a:t>Not “atomic”</a:t>
+            </a:r>
+          </a:p>
+          <a:p>
+            <a:r>
+              <a:rPr lang="en-US" dirty="0"/>
+              <a:t>Compensatory</a:t>
+            </a:r>
+          </a:p>
+          <a:p>
+            <a:pPr lvl="1"/>
+            <a:r>
+              <a:rPr lang="en-US" dirty="0"/>
+              <a:t>Reverses or undoes actions</a:t>
+            </a:r>
+          </a:p>
+          <a:p>
+            <a:endParaRPr lang="en-US" dirty="0"/>
+          </a:p>
+          <a:p>
+            <a:r>
+              <a:rPr lang="en-US" dirty="0"/>
+              <a:t>Important when work is broken down into smaller chunks</a:t>
+            </a:r>
+          </a:p>
+          <a:p>
+            <a:pPr lvl="1"/>
+            <a:r>
+              <a:rPr lang="en-US" dirty="0"/>
+              <a:t>Across processes</a:t>
+            </a:r>
+          </a:p>
+          <a:p>
+            <a:pPr lvl="1"/>
+            <a:r>
+              <a:rPr lang="en-US" dirty="0"/>
+              <a:t>Across services</a:t>
+            </a:r>
           </a:p>
         </p:txBody>
       </p:sp>
     </p:spTree>
     <p:extLst>
       <p:ext uri="{BB962C8B-B14F-4D97-AF65-F5344CB8AC3E}">
-        <p14:creationId xmlns:p14="http://schemas.microsoft.com/office/powerpoint/2010/main" val="746164347"/>
+        <p14:creationId xmlns:p14="http://schemas.microsoft.com/office/powerpoint/2010/main" val="2564122038"/>
       </p:ext>
     </p:extLst>
   </p:cSld>
@@ -9931,6 +10179,395 @@
       </p:grpSpPr>
       <p:sp>
         <p:nvSpPr>
+          <p:cNvPr id="2" name="Title 1">
+            <a:extLst>
+              <a:ext uri="{FF2B5EF4-FFF2-40B4-BE49-F238E27FC236}">
+                <a16:creationId xmlns:a16="http://schemas.microsoft.com/office/drawing/2014/main" id="{92BD5C19-89D1-4D94-BB2A-C3532B048063}"/>
+              </a:ext>
+            </a:extLst>
+          </p:cNvPr>
+          <p:cNvSpPr>
+            <a:spLocks noGrp="1"/>
+          </p:cNvSpPr>
+          <p:nvPr>
+            <p:ph type="title"/>
+          </p:nvPr>
+        </p:nvSpPr>
+        <p:spPr/>
+        <p:txBody>
+          <a:bodyPr/>
+          <a:lstStyle/>
+          <a:p>
+            <a:r>
+              <a:rPr lang="en-US" dirty="0"/>
+              <a:t>“Services”</a:t>
+            </a:r>
+          </a:p>
+        </p:txBody>
+      </p:sp>
+      <p:sp>
+        <p:nvSpPr>
+          <p:cNvPr id="3" name="Content Placeholder 2">
+            <a:extLst>
+              <a:ext uri="{FF2B5EF4-FFF2-40B4-BE49-F238E27FC236}">
+                <a16:creationId xmlns:a16="http://schemas.microsoft.com/office/drawing/2014/main" id="{BED08F12-B28E-4CB0-A6DD-ABD9C215D16C}"/>
+              </a:ext>
+            </a:extLst>
+          </p:cNvPr>
+          <p:cNvSpPr>
+            <a:spLocks noGrp="1"/>
+          </p:cNvSpPr>
+          <p:nvPr>
+            <p:ph idx="1"/>
+          </p:nvPr>
+        </p:nvSpPr>
+        <p:spPr/>
+        <p:txBody>
+          <a:bodyPr/>
+          <a:lstStyle/>
+          <a:p>
+            <a:r>
+              <a:rPr lang="en-US" dirty="0"/>
+              <a:t>Not just RESTful</a:t>
+            </a:r>
+          </a:p>
+          <a:p>
+            <a:pPr lvl="1"/>
+            <a:r>
+              <a:rPr lang="en-US" dirty="0"/>
+              <a:t>Message-oriented</a:t>
+            </a:r>
+          </a:p>
+          <a:p>
+            <a:pPr lvl="1"/>
+            <a:r>
+              <a:rPr lang="en-US" dirty="0"/>
+              <a:t>Hybrid</a:t>
+            </a:r>
+          </a:p>
+          <a:p>
+            <a:pPr lvl="1"/>
+            <a:r>
+              <a:rPr lang="en-US" dirty="0"/>
+              <a:t>Etc.</a:t>
+            </a:r>
+          </a:p>
+        </p:txBody>
+      </p:sp>
+    </p:spTree>
+    <p:extLst>
+      <p:ext uri="{BB962C8B-B14F-4D97-AF65-F5344CB8AC3E}">
+        <p14:creationId xmlns:p14="http://schemas.microsoft.com/office/powerpoint/2010/main" val="2018137143"/>
+      </p:ext>
+    </p:extLst>
+  </p:cSld>
+  <p:clrMapOvr>
+    <a:masterClrMapping/>
+  </p:clrMapOvr>
+</p:sld>
+</file>
+
+<file path=ppt/slides/slide4.xml><?xml version="1.0" encoding="utf-8"?>
+<p:sld xmlns:a="http://schemas.openxmlformats.org/drawingml/2006/main" xmlns:r="http://schemas.openxmlformats.org/officeDocument/2006/relationships" xmlns:p="http://schemas.openxmlformats.org/presentationml/2006/main">
+  <p:cSld>
+    <p:spTree>
+      <p:nvGrpSpPr>
+        <p:cNvPr id="1" name=""/>
+        <p:cNvGrpSpPr/>
+        <p:nvPr/>
+      </p:nvGrpSpPr>
+      <p:grpSpPr>
+        <a:xfrm>
+          <a:off x="0" y="0"/>
+          <a:ext cx="0" cy="0"/>
+          <a:chOff x="0" y="0"/>
+          <a:chExt cx="0" cy="0"/>
+        </a:xfrm>
+      </p:grpSpPr>
+      <p:sp>
+        <p:nvSpPr>
+          <p:cNvPr id="2" name="Title 1">
+            <a:extLst>
+              <a:ext uri="{FF2B5EF4-FFF2-40B4-BE49-F238E27FC236}">
+                <a16:creationId xmlns:a16="http://schemas.microsoft.com/office/drawing/2014/main" id="{3593CD12-40D8-4E73-928D-882CBE1CB711}"/>
+              </a:ext>
+            </a:extLst>
+          </p:cNvPr>
+          <p:cNvSpPr>
+            <a:spLocks noGrp="1"/>
+          </p:cNvSpPr>
+          <p:nvPr>
+            <p:ph type="title"/>
+          </p:nvPr>
+        </p:nvSpPr>
+        <p:spPr/>
+        <p:txBody>
+          <a:bodyPr/>
+          <a:lstStyle/>
+          <a:p>
+            <a:r>
+              <a:rPr lang="en-US" dirty="0"/>
+              <a:t>Agenda</a:t>
+            </a:r>
+          </a:p>
+        </p:txBody>
+      </p:sp>
+      <p:sp>
+        <p:nvSpPr>
+          <p:cNvPr id="3" name="Content Placeholder 2">
+            <a:extLst>
+              <a:ext uri="{FF2B5EF4-FFF2-40B4-BE49-F238E27FC236}">
+                <a16:creationId xmlns:a16="http://schemas.microsoft.com/office/drawing/2014/main" id="{1D831D67-BCA8-4480-ADBA-80EC1D90CC78}"/>
+              </a:ext>
+            </a:extLst>
+          </p:cNvPr>
+          <p:cNvSpPr>
+            <a:spLocks noGrp="1"/>
+          </p:cNvSpPr>
+          <p:nvPr>
+            <p:ph idx="1"/>
+          </p:nvPr>
+        </p:nvSpPr>
+        <p:spPr/>
+        <p:txBody>
+          <a:bodyPr/>
+          <a:lstStyle/>
+          <a:p>
+            <a:r>
+              <a:rPr lang="en-US" dirty="0"/>
+              <a:t>What is elastic scalability</a:t>
+            </a:r>
+          </a:p>
+          <a:p>
+            <a:r>
+              <a:rPr lang="en-US" dirty="0"/>
+              <a:t>Roadblocks</a:t>
+            </a:r>
+          </a:p>
+          <a:p>
+            <a:r>
+              <a:rPr lang="en-US" dirty="0"/>
+              <a:t>Avoiding Roadblocks</a:t>
+            </a:r>
+          </a:p>
+          <a:p>
+            <a:r>
+              <a:rPr lang="en-US" dirty="0"/>
+              <a:t>Long Term</a:t>
+            </a:r>
+          </a:p>
+          <a:p>
+            <a:r>
+              <a:rPr lang="en-US" dirty="0"/>
+              <a:t>Strategies</a:t>
+            </a:r>
+          </a:p>
+          <a:p>
+            <a:r>
+              <a:rPr lang="en-US" dirty="0"/>
+              <a:t>Q&amp;A, References</a:t>
+            </a:r>
+          </a:p>
+        </p:txBody>
+      </p:sp>
+    </p:spTree>
+    <p:extLst>
+      <p:ext uri="{BB962C8B-B14F-4D97-AF65-F5344CB8AC3E}">
+        <p14:creationId xmlns:p14="http://schemas.microsoft.com/office/powerpoint/2010/main" val="3144942931"/>
+      </p:ext>
+    </p:extLst>
+  </p:cSld>
+  <p:clrMapOvr>
+    <a:masterClrMapping/>
+  </p:clrMapOvr>
+</p:sld>
+</file>
+
+<file path=ppt/slides/slide40.xml><?xml version="1.0" encoding="utf-8"?>
+<p:sld xmlns:a="http://schemas.openxmlformats.org/drawingml/2006/main" xmlns:r="http://schemas.openxmlformats.org/officeDocument/2006/relationships" xmlns:p="http://schemas.openxmlformats.org/presentationml/2006/main">
+  <p:cSld>
+    <p:spTree>
+      <p:nvGrpSpPr>
+        <p:cNvPr id="1" name=""/>
+        <p:cNvGrpSpPr/>
+        <p:nvPr/>
+      </p:nvGrpSpPr>
+      <p:grpSpPr>
+        <a:xfrm>
+          <a:off x="0" y="0"/>
+          <a:ext cx="0" cy="0"/>
+          <a:chOff x="0" y="0"/>
+          <a:chExt cx="0" cy="0"/>
+        </a:xfrm>
+      </p:grpSpPr>
+      <p:sp>
+        <p:nvSpPr>
+          <p:cNvPr id="2" name="Title 1">
+            <a:extLst>
+              <a:ext uri="{FF2B5EF4-FFF2-40B4-BE49-F238E27FC236}">
+                <a16:creationId xmlns:a16="http://schemas.microsoft.com/office/drawing/2014/main" id="{992162D5-8B45-4FAE-A7F3-8CF63B9DB96A}"/>
+              </a:ext>
+            </a:extLst>
+          </p:cNvPr>
+          <p:cNvSpPr>
+            <a:spLocks noGrp="1"/>
+          </p:cNvSpPr>
+          <p:nvPr>
+            <p:ph type="title"/>
+          </p:nvPr>
+        </p:nvSpPr>
+        <p:spPr/>
+        <p:txBody>
+          <a:bodyPr/>
+          <a:lstStyle/>
+          <a:p>
+            <a:r>
+              <a:rPr lang="en-US" dirty="0"/>
+              <a:t>Questions?</a:t>
+            </a:r>
+          </a:p>
+        </p:txBody>
+      </p:sp>
+      <p:sp>
+        <p:nvSpPr>
+          <p:cNvPr id="3" name="Text Placeholder 2">
+            <a:extLst>
+              <a:ext uri="{FF2B5EF4-FFF2-40B4-BE49-F238E27FC236}">
+                <a16:creationId xmlns:a16="http://schemas.microsoft.com/office/drawing/2014/main" id="{EA337977-2578-4176-BC70-3BF778A54D51}"/>
+              </a:ext>
+            </a:extLst>
+          </p:cNvPr>
+          <p:cNvSpPr>
+            <a:spLocks noGrp="1"/>
+          </p:cNvSpPr>
+          <p:nvPr>
+            <p:ph type="body" idx="1"/>
+          </p:nvPr>
+        </p:nvSpPr>
+        <p:spPr/>
+        <p:txBody>
+          <a:bodyPr/>
+          <a:lstStyle/>
+          <a:p>
+            <a:endParaRPr lang="en-US"/>
+          </a:p>
+        </p:txBody>
+      </p:sp>
+    </p:spTree>
+    <p:extLst>
+      <p:ext uri="{BB962C8B-B14F-4D97-AF65-F5344CB8AC3E}">
+        <p14:creationId xmlns:p14="http://schemas.microsoft.com/office/powerpoint/2010/main" val="2281615065"/>
+      </p:ext>
+    </p:extLst>
+  </p:cSld>
+  <p:clrMapOvr>
+    <a:masterClrMapping/>
+  </p:clrMapOvr>
+</p:sld>
+</file>
+
+<file path=ppt/slides/slide41.xml><?xml version="1.0" encoding="utf-8"?>
+<p:sld xmlns:a="http://schemas.openxmlformats.org/drawingml/2006/main" xmlns:r="http://schemas.openxmlformats.org/officeDocument/2006/relationships" xmlns:p="http://schemas.openxmlformats.org/presentationml/2006/main">
+  <p:cSld>
+    <p:spTree>
+      <p:nvGrpSpPr>
+        <p:cNvPr id="1" name=""/>
+        <p:cNvGrpSpPr/>
+        <p:nvPr/>
+      </p:nvGrpSpPr>
+      <p:grpSpPr>
+        <a:xfrm>
+          <a:off x="0" y="0"/>
+          <a:ext cx="0" cy="0"/>
+          <a:chOff x="0" y="0"/>
+          <a:chExt cx="0" cy="0"/>
+        </a:xfrm>
+      </p:grpSpPr>
+      <p:sp>
+        <p:nvSpPr>
+          <p:cNvPr id="2" name="Title 1">
+            <a:extLst>
+              <a:ext uri="{FF2B5EF4-FFF2-40B4-BE49-F238E27FC236}">
+                <a16:creationId xmlns:a16="http://schemas.microsoft.com/office/drawing/2014/main" id="{992162D5-8B45-4FAE-A7F3-8CF63B9DB96A}"/>
+              </a:ext>
+            </a:extLst>
+          </p:cNvPr>
+          <p:cNvSpPr>
+            <a:spLocks noGrp="1"/>
+          </p:cNvSpPr>
+          <p:nvPr>
+            <p:ph type="title"/>
+          </p:nvPr>
+        </p:nvSpPr>
+        <p:spPr/>
+        <p:txBody>
+          <a:bodyPr/>
+          <a:lstStyle/>
+          <a:p>
+            <a:r>
+              <a:rPr lang="en-US" dirty="0"/>
+              <a:t>Thank You!</a:t>
+            </a:r>
+          </a:p>
+        </p:txBody>
+      </p:sp>
+      <p:sp>
+        <p:nvSpPr>
+          <p:cNvPr id="3" name="Text Placeholder 2">
+            <a:extLst>
+              <a:ext uri="{FF2B5EF4-FFF2-40B4-BE49-F238E27FC236}">
+                <a16:creationId xmlns:a16="http://schemas.microsoft.com/office/drawing/2014/main" id="{EA337977-2578-4176-BC70-3BF778A54D51}"/>
+              </a:ext>
+            </a:extLst>
+          </p:cNvPr>
+          <p:cNvSpPr>
+            <a:spLocks noGrp="1"/>
+          </p:cNvSpPr>
+          <p:nvPr>
+            <p:ph type="body" idx="1"/>
+          </p:nvPr>
+        </p:nvSpPr>
+        <p:spPr/>
+        <p:txBody>
+          <a:bodyPr/>
+          <a:lstStyle/>
+          <a:p>
+            <a:endParaRPr lang="en-US"/>
+          </a:p>
+        </p:txBody>
+      </p:sp>
+    </p:spTree>
+    <p:extLst>
+      <p:ext uri="{BB962C8B-B14F-4D97-AF65-F5344CB8AC3E}">
+        <p14:creationId xmlns:p14="http://schemas.microsoft.com/office/powerpoint/2010/main" val="746164347"/>
+      </p:ext>
+    </p:extLst>
+  </p:cSld>
+  <p:clrMapOvr>
+    <a:masterClrMapping/>
+  </p:clrMapOvr>
+</p:sld>
+</file>
+
+<file path=ppt/slides/slide42.xml><?xml version="1.0" encoding="utf-8"?>
+<p:sld xmlns:a="http://schemas.openxmlformats.org/drawingml/2006/main" xmlns:r="http://schemas.openxmlformats.org/officeDocument/2006/relationships" xmlns:p="http://schemas.openxmlformats.org/presentationml/2006/main">
+  <p:cSld>
+    <p:spTree>
+      <p:nvGrpSpPr>
+        <p:cNvPr id="1" name=""/>
+        <p:cNvGrpSpPr/>
+        <p:nvPr/>
+      </p:nvGrpSpPr>
+      <p:grpSpPr>
+        <a:xfrm>
+          <a:off x="0" y="0"/>
+          <a:ext cx="0" cy="0"/>
+          <a:chOff x="0" y="0"/>
+          <a:chExt cx="0" cy="0"/>
+        </a:xfrm>
+      </p:grpSpPr>
+      <p:sp>
+        <p:nvSpPr>
           <p:cNvPr id="2" name="Title 1"/>
           <p:cNvSpPr>
             <a:spLocks noGrp="1"/>
@@ -9963,7 +10600,9 @@
         </p:nvSpPr>
         <p:spPr/>
         <p:txBody>
-          <a:bodyPr/>
+          <a:bodyPr>
+            <a:normAutofit/>
+          </a:bodyPr>
           <a:lstStyle/>
           <a:p>
             <a:r>
@@ -9978,22 +10617,57 @@
             </a:r>
           </a:p>
           <a:p>
+            <a:r>
+              <a:rPr lang="en-US" dirty="0">
+                <a:hlinkClick r:id="rId3"/>
+              </a:rPr>
+              <a:t>http://bit.ly/TES-slides</a:t>
+            </a:r>
             <a:endParaRPr lang="en-US" dirty="0"/>
           </a:p>
           <a:p>
             <a:r>
+              <a:rPr lang="en-US" dirty="0">
+                <a:hlinkClick r:id="rId4"/>
+              </a:rPr>
+              <a:t>http://getakka.net/</a:t>
+            </a:r>
+            <a:endParaRPr lang="en-US" dirty="0"/>
+          </a:p>
+          <a:p>
+            <a:r>
+              <a:rPr lang="en-US" dirty="0">
+                <a:hlinkClick r:id="rId5"/>
+              </a:rPr>
+              <a:t>http://bit.ly/SeFaActors</a:t>
+            </a:r>
+            <a:r>
               <a:rPr lang="en-US" dirty="0"/>
               <a:t> </a:t>
             </a:r>
           </a:p>
           <a:p>
+            <a:r>
+              <a:rPr lang="en-US" dirty="0">
+                <a:hlinkClick r:id="rId6"/>
+              </a:rPr>
+              <a:t>http://bit.ly/SeFaServices</a:t>
+            </a:r>
             <a:endParaRPr lang="en-US" dirty="0"/>
           </a:p>
           <a:p>
-            <a:endParaRPr lang="en-US" dirty="0"/>
-          </a:p>
-          <a:p>
-            <a:endParaRPr lang="en-US" dirty="0"/>
+            <a:r>
+              <a:rPr lang="en-US" dirty="0"/>
+              <a:t>Tomorrow: </a:t>
+            </a:r>
+            <a:r>
+              <a:rPr lang="en-US" i="1" dirty="0"/>
+              <a:t>Introduction to…Service Fabric </a:t>
+            </a:r>
+            <a:r>
+              <a:rPr lang="en-US" dirty="0"/>
+              <a:t>Marquette A</a:t>
+            </a:r>
           </a:p>
           <a:p>
             <a:endParaRPr lang="en-US" dirty="0"/>
@@ -10032,7 +10706,7 @@
           <p:nvPr/>
         </p:nvPicPr>
         <p:blipFill>
-          <a:blip r:embed="rId3"/>
+          <a:blip r:embed="rId7"/>
           <a:stretch>
             <a:fillRect/>
           </a:stretch>
@@ -10062,7 +10736,7 @@
           <p:nvPr/>
         </p:nvPicPr>
         <p:blipFill>
-          <a:blip r:embed="rId4"/>
+          <a:blip r:embed="rId8"/>
           <a:stretch>
             <a:fillRect/>
           </a:stretch>
@@ -10090,7 +10764,7 @@
 </p:sld>
 </file>
 
-<file path=ppt/slides/slide4.xml><?xml version="1.0" encoding="utf-8"?>
+<file path=ppt/slides/slide5.xml><?xml version="1.0" encoding="utf-8"?>
 <p:sld xmlns:a="http://schemas.openxmlformats.org/drawingml/2006/main" xmlns:r="http://schemas.openxmlformats.org/officeDocument/2006/relationships" xmlns:p="http://schemas.openxmlformats.org/presentationml/2006/main">
   <p:cSld>
     <p:spTree>
@@ -10163,7 +10837,7 @@
 </p:sld>
 </file>
 
-<file path=ppt/slides/slide5.xml><?xml version="1.0" encoding="utf-8"?>
+<file path=ppt/slides/slide6.xml><?xml version="1.0" encoding="utf-8"?>
 <p:sld xmlns:a="http://schemas.openxmlformats.org/drawingml/2006/main" xmlns:r="http://schemas.openxmlformats.org/officeDocument/2006/relationships" xmlns:p="http://schemas.openxmlformats.org/presentationml/2006/main">
   <p:cSld>
     <p:spTree>
@@ -10366,98 +11040,6 @@
 </p:sld>
 </file>
 
-<file path=ppt/slides/slide6.xml><?xml version="1.0" encoding="utf-8"?>
-<p:sld xmlns:a="http://schemas.openxmlformats.org/drawingml/2006/main" xmlns:r="http://schemas.openxmlformats.org/officeDocument/2006/relationships" xmlns:p="http://schemas.openxmlformats.org/presentationml/2006/main">
-  <p:cSld>
-    <p:spTree>
-      <p:nvGrpSpPr>
-        <p:cNvPr id="1" name=""/>
-        <p:cNvGrpSpPr/>
-        <p:nvPr/>
-      </p:nvGrpSpPr>
-      <p:grpSpPr>
-        <a:xfrm>
-          <a:off x="0" y="0"/>
-          <a:ext cx="0" cy="0"/>
-          <a:chOff x="0" y="0"/>
-          <a:chExt cx="0" cy="0"/>
-        </a:xfrm>
-      </p:grpSpPr>
-      <p:sp>
-        <p:nvSpPr>
-          <p:cNvPr id="2" name="Title 1"/>
-          <p:cNvSpPr>
-            <a:spLocks noGrp="1"/>
-          </p:cNvSpPr>
-          <p:nvPr>
-            <p:ph type="title"/>
-          </p:nvPr>
-        </p:nvSpPr>
-        <p:spPr/>
-        <p:txBody>
-          <a:bodyPr/>
-          <a:lstStyle/>
-          <a:p>
-            <a:r>
-              <a:rPr lang="en-US" dirty="0"/>
-              <a:t>Towards?</a:t>
-            </a:r>
-          </a:p>
-        </p:txBody>
-      </p:sp>
-      <p:sp>
-        <p:nvSpPr>
-          <p:cNvPr id="3" name="Content Placeholder 2"/>
-          <p:cNvSpPr>
-            <a:spLocks noGrp="1"/>
-          </p:cNvSpPr>
-          <p:nvPr>
-            <p:ph idx="1"/>
-          </p:nvPr>
-        </p:nvSpPr>
-        <p:spPr/>
-        <p:txBody>
-          <a:bodyPr/>
-          <a:lstStyle/>
-          <a:p>
-            <a:r>
-              <a:rPr lang="en-US" dirty="0"/>
-              <a:t>Multiple ways to scale</a:t>
-            </a:r>
-          </a:p>
-          <a:p>
-            <a:r>
-              <a:rPr lang="en-US" dirty="0"/>
-              <a:t>Accounts for future need</a:t>
-            </a:r>
-          </a:p>
-          <a:p>
-            <a:r>
-              <a:rPr lang="en-US" dirty="0"/>
-              <a:t>Does not predict specific needs</a:t>
-            </a:r>
-          </a:p>
-          <a:p>
-            <a:r>
-              <a:rPr lang="en-US" dirty="0"/>
-              <a:t>Evolve over time</a:t>
-            </a:r>
-          </a:p>
-        </p:txBody>
-      </p:sp>
-    </p:spTree>
-    <p:extLst>
-      <p:ext uri="{BB962C8B-B14F-4D97-AF65-F5344CB8AC3E}">
-        <p14:creationId xmlns:p14="http://schemas.microsoft.com/office/powerpoint/2010/main" val="2222725227"/>
-      </p:ext>
-    </p:extLst>
-  </p:cSld>
-  <p:clrMapOvr>
-    <a:masterClrMapping/>
-  </p:clrMapOvr>
-</p:sld>
-</file>
-
 <file path=ppt/slides/slide7.xml><?xml version="1.0" encoding="utf-8"?>
 <p:sld xmlns:a="http://schemas.openxmlformats.org/drawingml/2006/main" xmlns:r="http://schemas.openxmlformats.org/officeDocument/2006/relationships" xmlns:p="http://schemas.openxmlformats.org/presentationml/2006/main">
   <p:cSld>
@@ -10492,34 +11074,55 @@
           <a:p>
             <a:r>
               <a:rPr lang="en-US" dirty="0"/>
-              <a:t>Roadblocks</a:t>
-            </a:r>
-          </a:p>
-        </p:txBody>
-      </p:sp>
-      <p:sp>
-        <p:nvSpPr>
-          <p:cNvPr id="3" name="Text Placeholder 2"/>
-          <p:cNvSpPr>
-            <a:spLocks noGrp="1"/>
-          </p:cNvSpPr>
-          <p:nvPr>
-            <p:ph type="body" idx="1"/>
-          </p:nvPr>
-        </p:nvSpPr>
-        <p:spPr/>
-        <p:txBody>
-          <a:bodyPr/>
-          <a:lstStyle/>
-          <a:p>
-            <a:endParaRPr lang="en-US"/>
+              <a:t>Towards?</a:t>
+            </a:r>
+          </a:p>
+        </p:txBody>
+      </p:sp>
+      <p:sp>
+        <p:nvSpPr>
+          <p:cNvPr id="3" name="Content Placeholder 2"/>
+          <p:cNvSpPr>
+            <a:spLocks noGrp="1"/>
+          </p:cNvSpPr>
+          <p:nvPr>
+            <p:ph idx="1"/>
+          </p:nvPr>
+        </p:nvSpPr>
+        <p:spPr/>
+        <p:txBody>
+          <a:bodyPr/>
+          <a:lstStyle/>
+          <a:p>
+            <a:r>
+              <a:rPr lang="en-US" dirty="0"/>
+              <a:t>Multiple ways to scale</a:t>
+            </a:r>
+          </a:p>
+          <a:p>
+            <a:r>
+              <a:rPr lang="en-US" dirty="0"/>
+              <a:t>Accounts for future need</a:t>
+            </a:r>
+          </a:p>
+          <a:p>
+            <a:r>
+              <a:rPr lang="en-US" dirty="0"/>
+              <a:t>Does not predict specific needs</a:t>
+            </a:r>
+          </a:p>
+          <a:p>
+            <a:r>
+              <a:rPr lang="en-US" dirty="0"/>
+              <a:t>Evolve over time</a:t>
+            </a:r>
           </a:p>
         </p:txBody>
       </p:sp>
     </p:spTree>
     <p:extLst>
       <p:ext uri="{BB962C8B-B14F-4D97-AF65-F5344CB8AC3E}">
-        <p14:creationId xmlns:p14="http://schemas.microsoft.com/office/powerpoint/2010/main" val="1482220194"/>
+        <p14:creationId xmlns:p14="http://schemas.microsoft.com/office/powerpoint/2010/main" val="2222725227"/>
       </p:ext>
     </p:extLst>
   </p:cSld>
@@ -10563,85 +11166,34 @@
           <a:p>
             <a:r>
               <a:rPr lang="en-US" dirty="0"/>
-              <a:t>Roadblocks to Elastic Scalability</a:t>
-            </a:r>
-          </a:p>
-        </p:txBody>
-      </p:sp>
-      <p:sp>
-        <p:nvSpPr>
-          <p:cNvPr id="3" name="Content Placeholder 2"/>
-          <p:cNvSpPr>
-            <a:spLocks noGrp="1"/>
-          </p:cNvSpPr>
-          <p:nvPr>
-            <p:ph idx="1"/>
-          </p:nvPr>
-        </p:nvSpPr>
-        <p:spPr/>
-        <p:txBody>
-          <a:bodyPr/>
-          <a:lstStyle/>
-          <a:p>
-            <a:r>
-              <a:rPr lang="en-US" dirty="0"/>
-              <a:t>Dependencies on specific servers</a:t>
-            </a:r>
-          </a:p>
-          <a:p>
-            <a:r>
-              <a:rPr lang="en-US" dirty="0"/>
-              <a:t>Dependencies on specific connections</a:t>
-            </a:r>
-          </a:p>
-          <a:p>
-            <a:r>
-              <a:rPr lang="en-US" dirty="0"/>
-              <a:t>Dependencies on specific data (versioning)</a:t>
-            </a:r>
-          </a:p>
-          <a:p>
-            <a:r>
-              <a:rPr lang="en-US" dirty="0" err="1"/>
-              <a:t>Statefulness</a:t>
-            </a:r>
-            <a:endParaRPr lang="en-US" dirty="0"/>
-          </a:p>
-          <a:p>
-            <a:r>
-              <a:rPr lang="en-US" dirty="0"/>
-              <a:t>Lack of robustness</a:t>
-            </a:r>
-          </a:p>
-          <a:p>
-            <a:r>
-              <a:rPr lang="en-US" dirty="0"/>
-              <a:t>Lack of fault tolerance</a:t>
-            </a:r>
-          </a:p>
-          <a:p>
-            <a:r>
-              <a:rPr lang="en-US" dirty="0"/>
-              <a:t>What is doing what, when, and where?</a:t>
-            </a:r>
-          </a:p>
-          <a:p>
-            <a:r>
-              <a:rPr lang="en-US" dirty="0"/>
-              <a:t>Lack of knowledge of </a:t>
-            </a:r>
-            <a:r>
-              <a:rPr lang="en-US" i="1" dirty="0"/>
-              <a:t>health</a:t>
-            </a:r>
-            <a:endParaRPr lang="en-US" dirty="0"/>
+              <a:t>Roadblocks</a:t>
+            </a:r>
+          </a:p>
+        </p:txBody>
+      </p:sp>
+      <p:sp>
+        <p:nvSpPr>
+          <p:cNvPr id="3" name="Text Placeholder 2"/>
+          <p:cNvSpPr>
+            <a:spLocks noGrp="1"/>
+          </p:cNvSpPr>
+          <p:nvPr>
+            <p:ph type="body" idx="1"/>
+          </p:nvPr>
+        </p:nvSpPr>
+        <p:spPr/>
+        <p:txBody>
+          <a:bodyPr/>
+          <a:lstStyle/>
+          <a:p>
+            <a:endParaRPr lang="en-US"/>
           </a:p>
         </p:txBody>
       </p:sp>
     </p:spTree>
     <p:extLst>
       <p:ext uri="{BB962C8B-B14F-4D97-AF65-F5344CB8AC3E}">
-        <p14:creationId xmlns:p14="http://schemas.microsoft.com/office/powerpoint/2010/main" val="3127392030"/>
+        <p14:creationId xmlns:p14="http://schemas.microsoft.com/office/powerpoint/2010/main" val="1482220194"/>
       </p:ext>
     </p:extLst>
   </p:cSld>
@@ -10685,41 +11237,85 @@
           <a:p>
             <a:r>
               <a:rPr lang="en-US" dirty="0"/>
-              <a:t>Dependencies on Specific Servers</a:t>
-            </a:r>
-          </a:p>
-        </p:txBody>
-      </p:sp>
-      <p:pic>
-        <p:nvPicPr>
-          <p:cNvPr id="4" name="Content Placeholder 3"/>
-          <p:cNvPicPr>
-            <a:picLocks noGrp="1" noChangeAspect="1"/>
-          </p:cNvPicPr>
+              <a:t>Roadblocks to Elastic Scalability</a:t>
+            </a:r>
+          </a:p>
+        </p:txBody>
+      </p:sp>
+      <p:sp>
+        <p:nvSpPr>
+          <p:cNvPr id="3" name="Content Placeholder 2"/>
+          <p:cNvSpPr>
+            <a:spLocks noGrp="1"/>
+          </p:cNvSpPr>
           <p:nvPr>
             <p:ph idx="1"/>
           </p:nvPr>
-        </p:nvPicPr>
-        <p:blipFill>
-          <a:blip r:embed="rId3"/>
-          <a:stretch>
-            <a:fillRect/>
-          </a:stretch>
-        </p:blipFill>
-        <p:spPr>
-          <a:xfrm>
-            <a:off x="3172759" y="3195068"/>
-            <a:ext cx="2956816" cy="1379340"/>
-          </a:xfrm>
-          <a:prstGeom prst="rect">
-            <a:avLst/>
-          </a:prstGeom>
-        </p:spPr>
-      </p:pic>
+        </p:nvSpPr>
+        <p:spPr/>
+        <p:txBody>
+          <a:bodyPr/>
+          <a:lstStyle/>
+          <a:p>
+            <a:r>
+              <a:rPr lang="en-US" dirty="0"/>
+              <a:t>Dependencies on specific servers</a:t>
+            </a:r>
+          </a:p>
+          <a:p>
+            <a:r>
+              <a:rPr lang="en-US" dirty="0"/>
+              <a:t>Dependencies on specific connections</a:t>
+            </a:r>
+          </a:p>
+          <a:p>
+            <a:r>
+              <a:rPr lang="en-US" dirty="0"/>
+              <a:t>Dependencies on specific data (versioning)</a:t>
+            </a:r>
+          </a:p>
+          <a:p>
+            <a:r>
+              <a:rPr lang="en-US" dirty="0" err="1"/>
+              <a:t>Statefulness</a:t>
+            </a:r>
+            <a:endParaRPr lang="en-US" dirty="0"/>
+          </a:p>
+          <a:p>
+            <a:r>
+              <a:rPr lang="en-US" dirty="0"/>
+              <a:t>Lack of robustness</a:t>
+            </a:r>
+          </a:p>
+          <a:p>
+            <a:r>
+              <a:rPr lang="en-US" dirty="0"/>
+              <a:t>Lack of fault tolerance</a:t>
+            </a:r>
+          </a:p>
+          <a:p>
+            <a:r>
+              <a:rPr lang="en-US" dirty="0"/>
+              <a:t>What is doing what, when, and where?</a:t>
+            </a:r>
+          </a:p>
+          <a:p>
+            <a:r>
+              <a:rPr lang="en-US" dirty="0"/>
+              <a:t>Lack of knowledge of </a:t>
+            </a:r>
+            <a:r>
+              <a:rPr lang="en-US" i="1" dirty="0"/>
+              <a:t>health</a:t>
+            </a:r>
+            <a:endParaRPr lang="en-US" dirty="0"/>
+          </a:p>
+        </p:txBody>
+      </p:sp>
     </p:spTree>
     <p:extLst>
       <p:ext uri="{BB962C8B-B14F-4D97-AF65-F5344CB8AC3E}">
-        <p14:creationId xmlns:p14="http://schemas.microsoft.com/office/powerpoint/2010/main" val="3773381317"/>
+        <p14:creationId xmlns:p14="http://schemas.microsoft.com/office/powerpoint/2010/main" val="3127392030"/>
       </p:ext>
     </p:extLst>
   </p:cSld>

</xml_diff>